<commit_message>
Little changes done which is given by yogeshvari maam
</commit_message>
<xml_diff>
--- a/Documentation/Diagrams.pptx
+++ b/Documentation/Diagrams.pptx
@@ -269,7 +269,7 @@
           <a:p>
             <a:fld id="{2BAF8A8F-D7E4-4A01-BE48-6527400756F1}" type="datetimeFigureOut">
               <a:rPr lang="en-IN" smtClean="0"/>
-              <a:t>29-05-2023</a:t>
+              <a:t>01-06-2023</a:t>
             </a:fld>
             <a:endParaRPr lang="en-IN"/>
           </a:p>
@@ -469,7 +469,7 @@
           <a:p>
             <a:fld id="{2BAF8A8F-D7E4-4A01-BE48-6527400756F1}" type="datetimeFigureOut">
               <a:rPr lang="en-IN" smtClean="0"/>
-              <a:t>29-05-2023</a:t>
+              <a:t>01-06-2023</a:t>
             </a:fld>
             <a:endParaRPr lang="en-IN"/>
           </a:p>
@@ -679,7 +679,7 @@
           <a:p>
             <a:fld id="{2BAF8A8F-D7E4-4A01-BE48-6527400756F1}" type="datetimeFigureOut">
               <a:rPr lang="en-IN" smtClean="0"/>
-              <a:t>29-05-2023</a:t>
+              <a:t>01-06-2023</a:t>
             </a:fld>
             <a:endParaRPr lang="en-IN"/>
           </a:p>
@@ -879,7 +879,7 @@
           <a:p>
             <a:fld id="{2BAF8A8F-D7E4-4A01-BE48-6527400756F1}" type="datetimeFigureOut">
               <a:rPr lang="en-IN" smtClean="0"/>
-              <a:t>29-05-2023</a:t>
+              <a:t>01-06-2023</a:t>
             </a:fld>
             <a:endParaRPr lang="en-IN"/>
           </a:p>
@@ -1155,7 +1155,7 @@
           <a:p>
             <a:fld id="{2BAF8A8F-D7E4-4A01-BE48-6527400756F1}" type="datetimeFigureOut">
               <a:rPr lang="en-IN" smtClean="0"/>
-              <a:t>29-05-2023</a:t>
+              <a:t>01-06-2023</a:t>
             </a:fld>
             <a:endParaRPr lang="en-IN"/>
           </a:p>
@@ -1423,7 +1423,7 @@
           <a:p>
             <a:fld id="{2BAF8A8F-D7E4-4A01-BE48-6527400756F1}" type="datetimeFigureOut">
               <a:rPr lang="en-IN" smtClean="0"/>
-              <a:t>29-05-2023</a:t>
+              <a:t>01-06-2023</a:t>
             </a:fld>
             <a:endParaRPr lang="en-IN"/>
           </a:p>
@@ -1838,7 +1838,7 @@
           <a:p>
             <a:fld id="{2BAF8A8F-D7E4-4A01-BE48-6527400756F1}" type="datetimeFigureOut">
               <a:rPr lang="en-IN" smtClean="0"/>
-              <a:t>29-05-2023</a:t>
+              <a:t>01-06-2023</a:t>
             </a:fld>
             <a:endParaRPr lang="en-IN"/>
           </a:p>
@@ -1980,7 +1980,7 @@
           <a:p>
             <a:fld id="{2BAF8A8F-D7E4-4A01-BE48-6527400756F1}" type="datetimeFigureOut">
               <a:rPr lang="en-IN" smtClean="0"/>
-              <a:t>29-05-2023</a:t>
+              <a:t>01-06-2023</a:t>
             </a:fld>
             <a:endParaRPr lang="en-IN"/>
           </a:p>
@@ -2093,7 +2093,7 @@
           <a:p>
             <a:fld id="{2BAF8A8F-D7E4-4A01-BE48-6527400756F1}" type="datetimeFigureOut">
               <a:rPr lang="en-IN" smtClean="0"/>
-              <a:t>29-05-2023</a:t>
+              <a:t>01-06-2023</a:t>
             </a:fld>
             <a:endParaRPr lang="en-IN"/>
           </a:p>
@@ -2406,7 +2406,7 @@
           <a:p>
             <a:fld id="{2BAF8A8F-D7E4-4A01-BE48-6527400756F1}" type="datetimeFigureOut">
               <a:rPr lang="en-IN" smtClean="0"/>
-              <a:t>29-05-2023</a:t>
+              <a:t>01-06-2023</a:t>
             </a:fld>
             <a:endParaRPr lang="en-IN"/>
           </a:p>
@@ -2695,7 +2695,7 @@
           <a:p>
             <a:fld id="{2BAF8A8F-D7E4-4A01-BE48-6527400756F1}" type="datetimeFigureOut">
               <a:rPr lang="en-IN" smtClean="0"/>
-              <a:t>29-05-2023</a:t>
+              <a:t>01-06-2023</a:t>
             </a:fld>
             <a:endParaRPr lang="en-IN"/>
           </a:p>
@@ -2938,7 +2938,7 @@
           <a:p>
             <a:fld id="{2BAF8A8F-D7E4-4A01-BE48-6527400756F1}" type="datetimeFigureOut">
               <a:rPr lang="en-IN" smtClean="0"/>
-              <a:t>29-05-2023</a:t>
+              <a:t>01-06-2023</a:t>
             </a:fld>
             <a:endParaRPr lang="en-IN"/>
           </a:p>
@@ -3357,10 +3357,10 @@
       </p:grpSpPr>
       <p:grpSp>
         <p:nvGrpSpPr>
-          <p:cNvPr id="77" name="Group 76">
+          <p:cNvPr id="38" name="Group 37">
             <a:extLst>
               <a:ext uri="{FF2B5EF4-FFF2-40B4-BE49-F238E27FC236}">
-                <a16:creationId xmlns:a16="http://schemas.microsoft.com/office/drawing/2014/main" id="{A2BBF789-07D6-FD03-797F-7C5EA2E2DF0E}"/>
+                <a16:creationId xmlns:a16="http://schemas.microsoft.com/office/drawing/2014/main" id="{D189090F-32D4-D739-670C-946C29393432}"/>
               </a:ext>
             </a:extLst>
           </p:cNvPr>
@@ -3369,10 +3369,10 @@
         </p:nvGrpSpPr>
         <p:grpSpPr>
           <a:xfrm>
-            <a:off x="371496" y="410900"/>
-            <a:ext cx="11624120" cy="6388715"/>
-            <a:chOff x="371496" y="410899"/>
-            <a:chExt cx="11624120" cy="6388715"/>
+            <a:off x="837226" y="410900"/>
+            <a:ext cx="11158390" cy="6388715"/>
+            <a:chOff x="837226" y="410900"/>
+            <a:chExt cx="11158390" cy="6388715"/>
           </a:xfrm>
         </p:grpSpPr>
         <p:sp>
@@ -3389,14 +3389,14 @@
           </p:nvSpPr>
           <p:spPr>
             <a:xfrm>
-              <a:off x="3406564" y="410899"/>
+              <a:off x="3406564" y="410900"/>
               <a:ext cx="8589052" cy="6388715"/>
             </a:xfrm>
             <a:prstGeom prst="rect">
               <a:avLst/>
             </a:prstGeom>
             <a:solidFill>
-              <a:srgbClr val="4942E4"/>
+              <a:srgbClr val="F9FBE7"/>
             </a:solidFill>
           </p:spPr>
           <p:style>
@@ -3442,7 +3442,7 @@
           </p:nvGrpSpPr>
           <p:grpSpPr>
             <a:xfrm>
-              <a:off x="3789191" y="581230"/>
+              <a:off x="3789191" y="581231"/>
               <a:ext cx="7884758" cy="5481917"/>
               <a:chOff x="3888269" y="688041"/>
               <a:chExt cx="7884758" cy="5481917"/>
@@ -4439,42 +4439,6 @@
             </p:txBody>
           </p:sp>
         </p:grpSp>
-        <p:pic>
-          <p:nvPicPr>
-            <p:cNvPr id="32" name="Picture 31">
-              <a:extLst>
-                <a:ext uri="{FF2B5EF4-FFF2-40B4-BE49-F238E27FC236}">
-                  <a16:creationId xmlns:a16="http://schemas.microsoft.com/office/drawing/2014/main" id="{37A7D9DC-8B18-889A-2A62-F5A3F607ECCC}"/>
-                </a:ext>
-              </a:extLst>
-            </p:cNvPr>
-            <p:cNvPicPr>
-              <a:picLocks noChangeAspect="1"/>
-            </p:cNvPicPr>
-            <p:nvPr/>
-          </p:nvPicPr>
-          <p:blipFill>
-            <a:blip r:embed="rId2">
-              <a:extLst>
-                <a:ext uri="{28A0092B-C50C-407E-A947-70E740481C1C}">
-                  <a14:useLocalDpi xmlns:a14="http://schemas.microsoft.com/office/drawing/2010/main" val="0"/>
-                </a:ext>
-              </a:extLst>
-            </a:blip>
-            <a:stretch>
-              <a:fillRect/>
-            </a:stretch>
-          </p:blipFill>
-          <p:spPr>
-            <a:xfrm>
-              <a:off x="371496" y="2564599"/>
-              <a:ext cx="1515178" cy="1515178"/>
-            </a:xfrm>
-            <a:prstGeom prst="rect">
-              <a:avLst/>
-            </a:prstGeom>
-          </p:spPr>
-        </p:pic>
         <p:sp>
           <p:nvSpPr>
             <p:cNvPr id="33" name="TextBox 32">
@@ -4489,7 +4453,7 @@
           </p:nvSpPr>
           <p:spPr>
             <a:xfrm>
-              <a:off x="729776" y="4126113"/>
+              <a:off x="837226" y="4139701"/>
               <a:ext cx="814647" cy="369332"/>
             </a:xfrm>
             <a:prstGeom prst="rect">
@@ -4522,13 +4486,12 @@
             </p:cNvPr>
             <p:cNvCxnSpPr>
               <a:cxnSpLocks/>
-              <a:stCxn id="32" idx="3"/>
             </p:cNvCxnSpPr>
             <p:nvPr/>
           </p:nvCxnSpPr>
           <p:spPr>
             <a:xfrm>
-              <a:off x="1886674" y="3322188"/>
+              <a:off x="1886674" y="3322189"/>
               <a:ext cx="462079" cy="0"/>
             </a:xfrm>
             <a:prstGeom prst="line">
@@ -4569,7 +4532,7 @@
           </p:nvGrpSpPr>
           <p:grpSpPr>
             <a:xfrm>
-              <a:off x="2344465" y="975677"/>
+              <a:off x="2344465" y="975678"/>
               <a:ext cx="1444726" cy="4693023"/>
               <a:chOff x="2344465" y="975677"/>
               <a:chExt cx="1444726" cy="4693023"/>
@@ -4815,7 +4778,7 @@
           </p:nvGrpSpPr>
           <p:grpSpPr>
             <a:xfrm>
-              <a:off x="6095999" y="975677"/>
+              <a:off x="6095999" y="975678"/>
               <a:ext cx="690601" cy="4693023"/>
               <a:chOff x="2344465" y="975677"/>
               <a:chExt cx="1444726" cy="4693023"/>
@@ -5053,7 +5016,7 @@
           </p:nvGrpSpPr>
           <p:grpSpPr>
             <a:xfrm>
-              <a:off x="9080216" y="975677"/>
+              <a:off x="9080216" y="975678"/>
               <a:ext cx="690601" cy="4693023"/>
               <a:chOff x="2344465" y="975677"/>
               <a:chExt cx="1444726" cy="4693023"/>
@@ -5293,7 +5256,7 @@
           </p:nvCxnSpPr>
           <p:spPr>
             <a:xfrm>
-              <a:off x="2344465" y="3322188"/>
+              <a:off x="2344465" y="3322189"/>
               <a:ext cx="1455868" cy="3124911"/>
             </a:xfrm>
             <a:prstGeom prst="line">
@@ -5336,7 +5299,7 @@
           </p:nvCxnSpPr>
           <p:spPr>
             <a:xfrm>
-              <a:off x="3784903" y="6439347"/>
+              <a:off x="3784903" y="6439348"/>
               <a:ext cx="5168597" cy="0"/>
             </a:xfrm>
             <a:prstGeom prst="line">
@@ -5379,7 +5342,7 @@
           </p:nvCxnSpPr>
           <p:spPr>
             <a:xfrm flipV="1">
-              <a:off x="8926830" y="3322188"/>
+              <a:off x="8926830" y="3322189"/>
               <a:ext cx="153386" cy="3117159"/>
             </a:xfrm>
             <a:prstGeom prst="line">
@@ -5422,7 +5385,7 @@
           </p:nvCxnSpPr>
           <p:spPr>
             <a:xfrm flipV="1">
-              <a:off x="5950658" y="3322188"/>
+              <a:off x="5950658" y="3322189"/>
               <a:ext cx="153386" cy="3117159"/>
             </a:xfrm>
             <a:prstGeom prst="line">
@@ -5449,6 +5412,291 @@
             </a:fontRef>
           </p:style>
         </p:cxnSp>
+        <p:grpSp>
+          <p:nvGrpSpPr>
+            <p:cNvPr id="36" name="Group 35">
+              <a:extLst>
+                <a:ext uri="{FF2B5EF4-FFF2-40B4-BE49-F238E27FC236}">
+                  <a16:creationId xmlns:a16="http://schemas.microsoft.com/office/drawing/2014/main" id="{C23D7CB7-31AF-AB93-A6EF-E76A7F54C1E4}"/>
+                </a:ext>
+              </a:extLst>
+            </p:cNvPr>
+            <p:cNvGrpSpPr/>
+            <p:nvPr/>
+          </p:nvGrpSpPr>
+          <p:grpSpPr>
+            <a:xfrm>
+              <a:off x="890982" y="2252396"/>
+              <a:ext cx="694640" cy="1887305"/>
+              <a:chOff x="890982" y="2252396"/>
+              <a:chExt cx="694640" cy="1887305"/>
+            </a:xfrm>
+          </p:grpSpPr>
+          <p:sp>
+            <p:nvSpPr>
+              <p:cNvPr id="2" name="Oval 1">
+                <a:extLst>
+                  <a:ext uri="{FF2B5EF4-FFF2-40B4-BE49-F238E27FC236}">
+                    <a16:creationId xmlns:a16="http://schemas.microsoft.com/office/drawing/2014/main" id="{DBE7A232-901E-A1E1-4377-FDE69498CAA8}"/>
+                  </a:ext>
+                </a:extLst>
+              </p:cNvPr>
+              <p:cNvSpPr/>
+              <p:nvPr/>
+            </p:nvSpPr>
+            <p:spPr>
+              <a:xfrm>
+                <a:off x="948301" y="2252396"/>
+                <a:ext cx="581970" cy="581970"/>
+              </a:xfrm>
+              <a:prstGeom prst="ellipse">
+                <a:avLst/>
+              </a:prstGeom>
+              <a:noFill/>
+              <a:ln w="38100">
+                <a:solidFill>
+                  <a:schemeClr val="tx1"/>
+                </a:solidFill>
+              </a:ln>
+            </p:spPr>
+            <p:style>
+              <a:lnRef idx="2">
+                <a:schemeClr val="accent1">
+                  <a:shade val="50000"/>
+                </a:schemeClr>
+              </a:lnRef>
+              <a:fillRef idx="1">
+                <a:schemeClr val="accent1"/>
+              </a:fillRef>
+              <a:effectRef idx="0">
+                <a:schemeClr val="accent1"/>
+              </a:effectRef>
+              <a:fontRef idx="minor">
+                <a:schemeClr val="lt1"/>
+              </a:fontRef>
+            </p:style>
+            <p:txBody>
+              <a:bodyPr rtlCol="0" anchor="ctr"/>
+              <a:lstStyle/>
+              <a:p>
+                <a:pPr algn="ctr"/>
+                <a:endParaRPr lang="en-IN"/>
+              </a:p>
+            </p:txBody>
+          </p:sp>
+          <p:cxnSp>
+            <p:nvCxnSpPr>
+              <p:cNvPr id="6" name="Straight Connector 5">
+                <a:extLst>
+                  <a:ext uri="{FF2B5EF4-FFF2-40B4-BE49-F238E27FC236}">
+                    <a16:creationId xmlns:a16="http://schemas.microsoft.com/office/drawing/2014/main" id="{92DFF526-89D3-DEB8-A52A-2D56D2E8266B}"/>
+                  </a:ext>
+                </a:extLst>
+              </p:cNvPr>
+              <p:cNvCxnSpPr>
+                <a:cxnSpLocks/>
+                <a:stCxn id="2" idx="4"/>
+              </p:cNvCxnSpPr>
+              <p:nvPr/>
+            </p:nvCxnSpPr>
+            <p:spPr>
+              <a:xfrm>
+                <a:off x="1239286" y="2834366"/>
+                <a:ext cx="5264" cy="846212"/>
+              </a:xfrm>
+              <a:prstGeom prst="line">
+                <a:avLst/>
+              </a:prstGeom>
+              <a:ln w="57150">
+                <a:solidFill>
+                  <a:schemeClr val="tx1"/>
+                </a:solidFill>
+              </a:ln>
+            </p:spPr>
+            <p:style>
+              <a:lnRef idx="1">
+                <a:schemeClr val="accent1"/>
+              </a:lnRef>
+              <a:fillRef idx="0">
+                <a:schemeClr val="accent1"/>
+              </a:fillRef>
+              <a:effectRef idx="0">
+                <a:schemeClr val="accent1"/>
+              </a:effectRef>
+              <a:fontRef idx="minor">
+                <a:schemeClr val="tx1"/>
+              </a:fontRef>
+            </p:style>
+          </p:cxnSp>
+          <p:cxnSp>
+            <p:nvCxnSpPr>
+              <p:cNvPr id="8" name="Straight Connector 7">
+                <a:extLst>
+                  <a:ext uri="{FF2B5EF4-FFF2-40B4-BE49-F238E27FC236}">
+                    <a16:creationId xmlns:a16="http://schemas.microsoft.com/office/drawing/2014/main" id="{010D83D5-EB8D-B8E9-35D0-B0EE07212057}"/>
+                  </a:ext>
+                </a:extLst>
+              </p:cNvPr>
+              <p:cNvCxnSpPr/>
+              <p:nvPr/>
+            </p:nvCxnSpPr>
+            <p:spPr>
+              <a:xfrm flipH="1">
+                <a:off x="890982" y="3680578"/>
+                <a:ext cx="348304" cy="459123"/>
+              </a:xfrm>
+              <a:prstGeom prst="line">
+                <a:avLst/>
+              </a:prstGeom>
+              <a:ln w="57150">
+                <a:solidFill>
+                  <a:schemeClr val="tx1"/>
+                </a:solidFill>
+              </a:ln>
+            </p:spPr>
+            <p:style>
+              <a:lnRef idx="1">
+                <a:schemeClr val="accent1"/>
+              </a:lnRef>
+              <a:fillRef idx="0">
+                <a:schemeClr val="accent1"/>
+              </a:fillRef>
+              <a:effectRef idx="0">
+                <a:schemeClr val="accent1"/>
+              </a:effectRef>
+              <a:fontRef idx="minor">
+                <a:schemeClr val="tx1"/>
+              </a:fontRef>
+            </p:style>
+          </p:cxnSp>
+          <p:cxnSp>
+            <p:nvCxnSpPr>
+              <p:cNvPr id="9" name="Straight Connector 8">
+                <a:extLst>
+                  <a:ext uri="{FF2B5EF4-FFF2-40B4-BE49-F238E27FC236}">
+                    <a16:creationId xmlns:a16="http://schemas.microsoft.com/office/drawing/2014/main" id="{BBC7BF4A-F0FC-53B1-E509-B3A60F445924}"/>
+                  </a:ext>
+                </a:extLst>
+              </p:cNvPr>
+              <p:cNvCxnSpPr>
+                <a:cxnSpLocks/>
+              </p:cNvCxnSpPr>
+              <p:nvPr/>
+            </p:nvCxnSpPr>
+            <p:spPr>
+              <a:xfrm>
+                <a:off x="1237318" y="3680578"/>
+                <a:ext cx="348304" cy="459123"/>
+              </a:xfrm>
+              <a:prstGeom prst="line">
+                <a:avLst/>
+              </a:prstGeom>
+              <a:ln w="57150">
+                <a:solidFill>
+                  <a:schemeClr val="tx1"/>
+                </a:solidFill>
+              </a:ln>
+            </p:spPr>
+            <p:style>
+              <a:lnRef idx="1">
+                <a:schemeClr val="accent1"/>
+              </a:lnRef>
+              <a:fillRef idx="0">
+                <a:schemeClr val="accent1"/>
+              </a:fillRef>
+              <a:effectRef idx="0">
+                <a:schemeClr val="accent1"/>
+              </a:effectRef>
+              <a:fontRef idx="minor">
+                <a:schemeClr val="tx1"/>
+              </a:fontRef>
+            </p:style>
+          </p:cxnSp>
+          <p:cxnSp>
+            <p:nvCxnSpPr>
+              <p:cNvPr id="11" name="Straight Connector 10">
+                <a:extLst>
+                  <a:ext uri="{FF2B5EF4-FFF2-40B4-BE49-F238E27FC236}">
+                    <a16:creationId xmlns:a16="http://schemas.microsoft.com/office/drawing/2014/main" id="{E7816913-BB04-1421-B0DC-589AE0DFFC80}"/>
+                  </a:ext>
+                </a:extLst>
+              </p:cNvPr>
+              <p:cNvCxnSpPr/>
+              <p:nvPr/>
+            </p:nvCxnSpPr>
+            <p:spPr>
+              <a:xfrm flipH="1">
+                <a:off x="890982" y="3031746"/>
+                <a:ext cx="348304" cy="459123"/>
+              </a:xfrm>
+              <a:prstGeom prst="line">
+                <a:avLst/>
+              </a:prstGeom>
+              <a:ln w="57150">
+                <a:solidFill>
+                  <a:schemeClr val="tx1"/>
+                </a:solidFill>
+              </a:ln>
+            </p:spPr>
+            <p:style>
+              <a:lnRef idx="1">
+                <a:schemeClr val="accent1"/>
+              </a:lnRef>
+              <a:fillRef idx="0">
+                <a:schemeClr val="accent1"/>
+              </a:fillRef>
+              <a:effectRef idx="0">
+                <a:schemeClr val="accent1"/>
+              </a:effectRef>
+              <a:fontRef idx="minor">
+                <a:schemeClr val="tx1"/>
+              </a:fontRef>
+            </p:style>
+          </p:cxnSp>
+          <p:cxnSp>
+            <p:nvCxnSpPr>
+              <p:cNvPr id="12" name="Straight Connector 11">
+                <a:extLst>
+                  <a:ext uri="{FF2B5EF4-FFF2-40B4-BE49-F238E27FC236}">
+                    <a16:creationId xmlns:a16="http://schemas.microsoft.com/office/drawing/2014/main" id="{AB7D87E3-F056-0B3E-E964-4694E8F1AD0E}"/>
+                  </a:ext>
+                </a:extLst>
+              </p:cNvPr>
+              <p:cNvCxnSpPr>
+                <a:cxnSpLocks/>
+              </p:cNvCxnSpPr>
+              <p:nvPr/>
+            </p:nvCxnSpPr>
+            <p:spPr>
+              <a:xfrm>
+                <a:off x="1237318" y="3031746"/>
+                <a:ext cx="348304" cy="459123"/>
+              </a:xfrm>
+              <a:prstGeom prst="line">
+                <a:avLst/>
+              </a:prstGeom>
+              <a:ln w="57150">
+                <a:solidFill>
+                  <a:schemeClr val="tx1"/>
+                </a:solidFill>
+              </a:ln>
+            </p:spPr>
+            <p:style>
+              <a:lnRef idx="1">
+                <a:schemeClr val="accent1"/>
+              </a:lnRef>
+              <a:fillRef idx="0">
+                <a:schemeClr val="accent1"/>
+              </a:fillRef>
+              <a:effectRef idx="0">
+                <a:schemeClr val="accent1"/>
+              </a:effectRef>
+              <a:fontRef idx="minor">
+                <a:schemeClr val="tx1"/>
+              </a:fontRef>
+            </p:style>
+          </p:cxnSp>
+        </p:grpSp>
       </p:grpSp>
     </p:spTree>
     <p:extLst>
@@ -5482,10 +5730,10 @@
       </p:grpSpPr>
       <p:grpSp>
         <p:nvGrpSpPr>
-          <p:cNvPr id="79" name="Group 78">
+          <p:cNvPr id="23" name="Group 22">
             <a:extLst>
               <a:ext uri="{FF2B5EF4-FFF2-40B4-BE49-F238E27FC236}">
-                <a16:creationId xmlns:a16="http://schemas.microsoft.com/office/drawing/2014/main" id="{DBFCD420-471B-473E-B04A-CA218C3937F5}"/>
+                <a16:creationId xmlns:a16="http://schemas.microsoft.com/office/drawing/2014/main" id="{A7A42E92-2BEF-B505-80A1-7DFCB24A7925}"/>
               </a:ext>
             </a:extLst>
           </p:cNvPr>
@@ -5494,10 +5742,10 @@
         </p:nvGrpSpPr>
         <p:grpSpPr>
           <a:xfrm>
-            <a:off x="1259658" y="234643"/>
-            <a:ext cx="8554903" cy="6388715"/>
-            <a:chOff x="497657" y="336176"/>
-            <a:chExt cx="8554903" cy="6388715"/>
+            <a:off x="1637964" y="234643"/>
+            <a:ext cx="8176597" cy="5899939"/>
+            <a:chOff x="1637964" y="234643"/>
+            <a:chExt cx="8176597" cy="5899939"/>
           </a:xfrm>
         </p:grpSpPr>
         <p:sp>
@@ -5514,14 +5762,14 @@
           </p:nvSpPr>
           <p:spPr>
             <a:xfrm>
-              <a:off x="3437044" y="336176"/>
-              <a:ext cx="5615516" cy="6388715"/>
+              <a:off x="4199045" y="234643"/>
+              <a:ext cx="5615516" cy="5899939"/>
             </a:xfrm>
             <a:prstGeom prst="rect">
               <a:avLst/>
             </a:prstGeom>
             <a:solidFill>
-              <a:srgbClr val="4942E4"/>
+              <a:srgbClr val="F9FBE7"/>
             </a:solidFill>
           </p:spPr>
           <p:style>
@@ -5567,7 +5815,7 @@
           </p:nvGrpSpPr>
           <p:grpSpPr>
             <a:xfrm>
-              <a:off x="3789191" y="581230"/>
+              <a:off x="4551192" y="479697"/>
               <a:ext cx="4940927" cy="5481917"/>
               <a:chOff x="3888269" y="688041"/>
               <a:chExt cx="4940927" cy="5481917"/>
@@ -6102,42 +6350,6 @@
             </p:txBody>
           </p:sp>
         </p:grpSp>
-        <p:sp>
-          <p:nvSpPr>
-            <p:cNvPr id="33" name="TextBox 32">
-              <a:extLst>
-                <a:ext uri="{FF2B5EF4-FFF2-40B4-BE49-F238E27FC236}">
-                  <a16:creationId xmlns:a16="http://schemas.microsoft.com/office/drawing/2014/main" id="{443AECBE-4515-D83B-6D51-0203EB452DDE}"/>
-                </a:ext>
-              </a:extLst>
-            </p:cNvPr>
-            <p:cNvSpPr txBox="1"/>
-            <p:nvPr/>
-          </p:nvSpPr>
-          <p:spPr>
-            <a:xfrm>
-              <a:off x="729776" y="4000060"/>
-              <a:ext cx="862865" cy="369332"/>
-            </a:xfrm>
-            <a:prstGeom prst="rect">
-              <a:avLst/>
-            </a:prstGeom>
-            <a:noFill/>
-          </p:spPr>
-          <p:txBody>
-            <a:bodyPr wrap="none" rtlCol="0">
-              <a:spAutoFit/>
-            </a:bodyPr>
-            <a:lstStyle/>
-            <a:p>
-              <a:r>
-                <a:rPr lang="en-GB" b="1" dirty="0"/>
-                <a:t>Faculty</a:t>
-              </a:r>
-              <a:endParaRPr lang="en-IN" b="1" dirty="0"/>
-            </a:p>
-          </p:txBody>
-        </p:sp>
         <p:cxnSp>
           <p:nvCxnSpPr>
             <p:cNvPr id="35" name="Straight Connector 34">
@@ -6154,7 +6366,7 @@
           </p:nvCxnSpPr>
           <p:spPr>
             <a:xfrm>
-              <a:off x="1886674" y="3322188"/>
+              <a:off x="2648675" y="3220655"/>
               <a:ext cx="462079" cy="0"/>
             </a:xfrm>
             <a:prstGeom prst="line">
@@ -6195,7 +6407,7 @@
           </p:nvGrpSpPr>
           <p:grpSpPr>
             <a:xfrm>
-              <a:off x="2344465" y="975677"/>
+              <a:off x="3106466" y="874144"/>
               <a:ext cx="1444726" cy="4693023"/>
               <a:chOff x="2344465" y="975677"/>
               <a:chExt cx="1444726" cy="4693023"/>
@@ -6427,42 +6639,6 @@
             </p:style>
           </p:cxnSp>
         </p:grpSp>
-        <p:pic>
-          <p:nvPicPr>
-            <p:cNvPr id="3" name="Picture 2">
-              <a:extLst>
-                <a:ext uri="{FF2B5EF4-FFF2-40B4-BE49-F238E27FC236}">
-                  <a16:creationId xmlns:a16="http://schemas.microsoft.com/office/drawing/2014/main" id="{CF530F09-28F4-452D-DBC8-20D43D3C9168}"/>
-                </a:ext>
-              </a:extLst>
-            </p:cNvPr>
-            <p:cNvPicPr>
-              <a:picLocks noChangeAspect="1"/>
-            </p:cNvPicPr>
-            <p:nvPr/>
-          </p:nvPicPr>
-          <p:blipFill>
-            <a:blip r:embed="rId2">
-              <a:extLst>
-                <a:ext uri="{28A0092B-C50C-407E-A947-70E740481C1C}">
-                  <a14:useLocalDpi xmlns:a14="http://schemas.microsoft.com/office/drawing/2010/main" val="0"/>
-                </a:ext>
-              </a:extLst>
-            </a:blip>
-            <a:stretch>
-              <a:fillRect/>
-            </a:stretch>
-          </p:blipFill>
-          <p:spPr>
-            <a:xfrm>
-              <a:off x="497657" y="2644316"/>
-              <a:ext cx="1355744" cy="1355744"/>
-            </a:xfrm>
-            <a:prstGeom prst="rect">
-              <a:avLst/>
-            </a:prstGeom>
-          </p:spPr>
-        </p:pic>
         <p:grpSp>
           <p:nvGrpSpPr>
             <p:cNvPr id="31" name="Group 30">
@@ -6477,7 +6653,7 @@
           </p:nvGrpSpPr>
           <p:grpSpPr>
             <a:xfrm>
-              <a:off x="5469255" y="1509425"/>
+              <a:off x="6231256" y="1407892"/>
               <a:ext cx="1539240" cy="968043"/>
               <a:chOff x="5469255" y="1509425"/>
               <a:chExt cx="1539240" cy="968043"/>
@@ -6678,7 +6854,7 @@
           </p:nvGrpSpPr>
           <p:grpSpPr>
             <a:xfrm>
-              <a:off x="5469255" y="2708305"/>
+              <a:off x="6231256" y="2606772"/>
               <a:ext cx="1539240" cy="968043"/>
               <a:chOff x="5469255" y="1509425"/>
               <a:chExt cx="1539240" cy="968043"/>
@@ -6879,7 +7055,7 @@
           </p:nvGrpSpPr>
           <p:grpSpPr>
             <a:xfrm>
-              <a:off x="5469255" y="3871268"/>
+              <a:off x="6231256" y="3769735"/>
               <a:ext cx="1539240" cy="968043"/>
               <a:chOff x="5469255" y="1509425"/>
               <a:chExt cx="1539240" cy="968043"/>
@@ -7066,6 +7242,348 @@
             </p:txBody>
           </p:sp>
         </p:grpSp>
+        <p:grpSp>
+          <p:nvGrpSpPr>
+            <p:cNvPr id="15" name="Group 14">
+              <a:extLst>
+                <a:ext uri="{FF2B5EF4-FFF2-40B4-BE49-F238E27FC236}">
+                  <a16:creationId xmlns:a16="http://schemas.microsoft.com/office/drawing/2014/main" id="{F3788A8C-DAA1-C29C-29E8-94746838373A}"/>
+                </a:ext>
+              </a:extLst>
+            </p:cNvPr>
+            <p:cNvGrpSpPr/>
+            <p:nvPr/>
+          </p:nvGrpSpPr>
+          <p:grpSpPr>
+            <a:xfrm>
+              <a:off x="1637964" y="2057565"/>
+              <a:ext cx="862865" cy="2326181"/>
+              <a:chOff x="1191380" y="2252396"/>
+              <a:chExt cx="862865" cy="2326181"/>
+            </a:xfrm>
+          </p:grpSpPr>
+          <p:sp>
+            <p:nvSpPr>
+              <p:cNvPr id="33" name="TextBox 32">
+                <a:extLst>
+                  <a:ext uri="{FF2B5EF4-FFF2-40B4-BE49-F238E27FC236}">
+                    <a16:creationId xmlns:a16="http://schemas.microsoft.com/office/drawing/2014/main" id="{443AECBE-4515-D83B-6D51-0203EB452DDE}"/>
+                  </a:ext>
+                </a:extLst>
+              </p:cNvPr>
+              <p:cNvSpPr txBox="1"/>
+              <p:nvPr/>
+            </p:nvSpPr>
+            <p:spPr>
+              <a:xfrm>
+                <a:off x="1191380" y="4209245"/>
+                <a:ext cx="862865" cy="369332"/>
+              </a:xfrm>
+              <a:prstGeom prst="rect">
+                <a:avLst/>
+              </a:prstGeom>
+              <a:noFill/>
+            </p:spPr>
+            <p:txBody>
+              <a:bodyPr wrap="none" rtlCol="0">
+                <a:spAutoFit/>
+              </a:bodyPr>
+              <a:lstStyle/>
+              <a:p>
+                <a:r>
+                  <a:rPr lang="en-GB" b="1" dirty="0"/>
+                  <a:t>Faculty</a:t>
+                </a:r>
+                <a:endParaRPr lang="en-IN" b="1" dirty="0"/>
+              </a:p>
+            </p:txBody>
+          </p:sp>
+          <p:grpSp>
+            <p:nvGrpSpPr>
+              <p:cNvPr id="2" name="Group 1">
+                <a:extLst>
+                  <a:ext uri="{FF2B5EF4-FFF2-40B4-BE49-F238E27FC236}">
+                    <a16:creationId xmlns:a16="http://schemas.microsoft.com/office/drawing/2014/main" id="{BE3968D7-D80A-3569-1342-B6A6848BA2C0}"/>
+                  </a:ext>
+                </a:extLst>
+              </p:cNvPr>
+              <p:cNvGrpSpPr/>
+              <p:nvPr/>
+            </p:nvGrpSpPr>
+            <p:grpSpPr>
+              <a:xfrm>
+                <a:off x="1275492" y="2252396"/>
+                <a:ext cx="694640" cy="1887305"/>
+                <a:chOff x="890982" y="2252396"/>
+                <a:chExt cx="694640" cy="1887305"/>
+              </a:xfrm>
+            </p:grpSpPr>
+            <p:sp>
+              <p:nvSpPr>
+                <p:cNvPr id="6" name="Oval 5">
+                  <a:extLst>
+                    <a:ext uri="{FF2B5EF4-FFF2-40B4-BE49-F238E27FC236}">
+                      <a16:creationId xmlns:a16="http://schemas.microsoft.com/office/drawing/2014/main" id="{992BE858-4E29-DF15-79A1-1733C8936D77}"/>
+                    </a:ext>
+                  </a:extLst>
+                </p:cNvPr>
+                <p:cNvSpPr/>
+                <p:nvPr/>
+              </p:nvSpPr>
+              <p:spPr>
+                <a:xfrm>
+                  <a:off x="948301" y="2252396"/>
+                  <a:ext cx="581970" cy="581970"/>
+                </a:xfrm>
+                <a:prstGeom prst="ellipse">
+                  <a:avLst/>
+                </a:prstGeom>
+                <a:noFill/>
+                <a:ln w="38100">
+                  <a:solidFill>
+                    <a:schemeClr val="tx1"/>
+                  </a:solidFill>
+                </a:ln>
+              </p:spPr>
+              <p:style>
+                <a:lnRef idx="2">
+                  <a:schemeClr val="accent1">
+                    <a:shade val="50000"/>
+                  </a:schemeClr>
+                </a:lnRef>
+                <a:fillRef idx="1">
+                  <a:schemeClr val="accent1"/>
+                </a:fillRef>
+                <a:effectRef idx="0">
+                  <a:schemeClr val="accent1"/>
+                </a:effectRef>
+                <a:fontRef idx="minor">
+                  <a:schemeClr val="lt1"/>
+                </a:fontRef>
+              </p:style>
+              <p:txBody>
+                <a:bodyPr rtlCol="0" anchor="ctr"/>
+                <a:lstStyle/>
+                <a:p>
+                  <a:pPr algn="ctr"/>
+                  <a:endParaRPr lang="en-IN"/>
+                </a:p>
+              </p:txBody>
+            </p:sp>
+            <p:cxnSp>
+              <p:nvCxnSpPr>
+                <p:cNvPr id="8" name="Straight Connector 7">
+                  <a:extLst>
+                    <a:ext uri="{FF2B5EF4-FFF2-40B4-BE49-F238E27FC236}">
+                      <a16:creationId xmlns:a16="http://schemas.microsoft.com/office/drawing/2014/main" id="{BC6E2793-75EB-E842-CF5B-7346BF55EFE9}"/>
+                    </a:ext>
+                  </a:extLst>
+                </p:cNvPr>
+                <p:cNvCxnSpPr>
+                  <a:cxnSpLocks/>
+                  <a:stCxn id="6" idx="4"/>
+                </p:cNvCxnSpPr>
+                <p:nvPr/>
+              </p:nvCxnSpPr>
+              <p:spPr>
+                <a:xfrm>
+                  <a:off x="1239286" y="2834366"/>
+                  <a:ext cx="5264" cy="846212"/>
+                </a:xfrm>
+                <a:prstGeom prst="line">
+                  <a:avLst/>
+                </a:prstGeom>
+                <a:ln w="57150">
+                  <a:solidFill>
+                    <a:schemeClr val="tx1"/>
+                  </a:solidFill>
+                </a:ln>
+              </p:spPr>
+              <p:style>
+                <a:lnRef idx="1">
+                  <a:schemeClr val="accent1"/>
+                </a:lnRef>
+                <a:fillRef idx="0">
+                  <a:schemeClr val="accent1"/>
+                </a:fillRef>
+                <a:effectRef idx="0">
+                  <a:schemeClr val="accent1"/>
+                </a:effectRef>
+                <a:fontRef idx="minor">
+                  <a:schemeClr val="tx1"/>
+                </a:fontRef>
+              </p:style>
+            </p:cxnSp>
+            <p:cxnSp>
+              <p:nvCxnSpPr>
+                <p:cNvPr id="9" name="Straight Connector 8">
+                  <a:extLst>
+                    <a:ext uri="{FF2B5EF4-FFF2-40B4-BE49-F238E27FC236}">
+                      <a16:creationId xmlns:a16="http://schemas.microsoft.com/office/drawing/2014/main" id="{05CB8780-7D5A-5957-0FFD-309049906A02}"/>
+                    </a:ext>
+                  </a:extLst>
+                </p:cNvPr>
+                <p:cNvCxnSpPr/>
+                <p:nvPr/>
+              </p:nvCxnSpPr>
+              <p:spPr>
+                <a:xfrm flipH="1">
+                  <a:off x="890982" y="3680578"/>
+                  <a:ext cx="348304" cy="459123"/>
+                </a:xfrm>
+                <a:prstGeom prst="line">
+                  <a:avLst/>
+                </a:prstGeom>
+                <a:ln w="57150">
+                  <a:solidFill>
+                    <a:schemeClr val="tx1"/>
+                  </a:solidFill>
+                </a:ln>
+              </p:spPr>
+              <p:style>
+                <a:lnRef idx="1">
+                  <a:schemeClr val="accent1"/>
+                </a:lnRef>
+                <a:fillRef idx="0">
+                  <a:schemeClr val="accent1"/>
+                </a:fillRef>
+                <a:effectRef idx="0">
+                  <a:schemeClr val="accent1"/>
+                </a:effectRef>
+                <a:fontRef idx="minor">
+                  <a:schemeClr val="tx1"/>
+                </a:fontRef>
+              </p:style>
+            </p:cxnSp>
+            <p:cxnSp>
+              <p:nvCxnSpPr>
+                <p:cNvPr id="10" name="Straight Connector 9">
+                  <a:extLst>
+                    <a:ext uri="{FF2B5EF4-FFF2-40B4-BE49-F238E27FC236}">
+                      <a16:creationId xmlns:a16="http://schemas.microsoft.com/office/drawing/2014/main" id="{9F60ADDB-44F8-68A4-39F1-814581B4CA13}"/>
+                    </a:ext>
+                  </a:extLst>
+                </p:cNvPr>
+                <p:cNvCxnSpPr>
+                  <a:cxnSpLocks/>
+                </p:cNvCxnSpPr>
+                <p:nvPr/>
+              </p:nvCxnSpPr>
+              <p:spPr>
+                <a:xfrm>
+                  <a:off x="1237318" y="3680578"/>
+                  <a:ext cx="348304" cy="459123"/>
+                </a:xfrm>
+                <a:prstGeom prst="line">
+                  <a:avLst/>
+                </a:prstGeom>
+                <a:ln w="57150">
+                  <a:solidFill>
+                    <a:schemeClr val="tx1"/>
+                  </a:solidFill>
+                </a:ln>
+              </p:spPr>
+              <p:style>
+                <a:lnRef idx="1">
+                  <a:schemeClr val="accent1"/>
+                </a:lnRef>
+                <a:fillRef idx="0">
+                  <a:schemeClr val="accent1"/>
+                </a:fillRef>
+                <a:effectRef idx="0">
+                  <a:schemeClr val="accent1"/>
+                </a:effectRef>
+                <a:fontRef idx="minor">
+                  <a:schemeClr val="tx1"/>
+                </a:fontRef>
+              </p:style>
+            </p:cxnSp>
+            <p:cxnSp>
+              <p:nvCxnSpPr>
+                <p:cNvPr id="11" name="Straight Connector 10">
+                  <a:extLst>
+                    <a:ext uri="{FF2B5EF4-FFF2-40B4-BE49-F238E27FC236}">
+                      <a16:creationId xmlns:a16="http://schemas.microsoft.com/office/drawing/2014/main" id="{156BB347-74B9-0C24-5A51-DC253BCEBD4C}"/>
+                    </a:ext>
+                  </a:extLst>
+                </p:cNvPr>
+                <p:cNvCxnSpPr/>
+                <p:nvPr/>
+              </p:nvCxnSpPr>
+              <p:spPr>
+                <a:xfrm flipH="1">
+                  <a:off x="890982" y="3031746"/>
+                  <a:ext cx="348304" cy="459123"/>
+                </a:xfrm>
+                <a:prstGeom prst="line">
+                  <a:avLst/>
+                </a:prstGeom>
+                <a:ln w="57150">
+                  <a:solidFill>
+                    <a:schemeClr val="tx1"/>
+                  </a:solidFill>
+                </a:ln>
+              </p:spPr>
+              <p:style>
+                <a:lnRef idx="1">
+                  <a:schemeClr val="accent1"/>
+                </a:lnRef>
+                <a:fillRef idx="0">
+                  <a:schemeClr val="accent1"/>
+                </a:fillRef>
+                <a:effectRef idx="0">
+                  <a:schemeClr val="accent1"/>
+                </a:effectRef>
+                <a:fontRef idx="minor">
+                  <a:schemeClr val="tx1"/>
+                </a:fontRef>
+              </p:style>
+            </p:cxnSp>
+            <p:cxnSp>
+              <p:nvCxnSpPr>
+                <p:cNvPr id="12" name="Straight Connector 11">
+                  <a:extLst>
+                    <a:ext uri="{FF2B5EF4-FFF2-40B4-BE49-F238E27FC236}">
+                      <a16:creationId xmlns:a16="http://schemas.microsoft.com/office/drawing/2014/main" id="{EF63F12A-4CCD-33EA-AC44-0D4ABB41DF9C}"/>
+                    </a:ext>
+                  </a:extLst>
+                </p:cNvPr>
+                <p:cNvCxnSpPr>
+                  <a:cxnSpLocks/>
+                </p:cNvCxnSpPr>
+                <p:nvPr/>
+              </p:nvCxnSpPr>
+              <p:spPr>
+                <a:xfrm>
+                  <a:off x="1237318" y="3031746"/>
+                  <a:ext cx="348304" cy="459123"/>
+                </a:xfrm>
+                <a:prstGeom prst="line">
+                  <a:avLst/>
+                </a:prstGeom>
+                <a:ln w="57150">
+                  <a:solidFill>
+                    <a:schemeClr val="tx1"/>
+                  </a:solidFill>
+                </a:ln>
+              </p:spPr>
+              <p:style>
+                <a:lnRef idx="1">
+                  <a:schemeClr val="accent1"/>
+                </a:lnRef>
+                <a:fillRef idx="0">
+                  <a:schemeClr val="accent1"/>
+                </a:fillRef>
+                <a:effectRef idx="0">
+                  <a:schemeClr val="accent1"/>
+                </a:effectRef>
+                <a:fontRef idx="minor">
+                  <a:schemeClr val="tx1"/>
+                </a:fontRef>
+              </p:style>
+            </p:cxnSp>
+          </p:grpSp>
+        </p:grpSp>
       </p:grpSp>
     </p:spTree>
     <p:extLst>
@@ -7099,10 +7617,10 @@
       </p:grpSpPr>
       <p:grpSp>
         <p:nvGrpSpPr>
-          <p:cNvPr id="23" name="Group 22">
+          <p:cNvPr id="14" name="Group 13">
             <a:extLst>
               <a:ext uri="{FF2B5EF4-FFF2-40B4-BE49-F238E27FC236}">
-                <a16:creationId xmlns:a16="http://schemas.microsoft.com/office/drawing/2014/main" id="{ACF9EFB1-0958-1DC4-9006-B9697A895EA9}"/>
+                <a16:creationId xmlns:a16="http://schemas.microsoft.com/office/drawing/2014/main" id="{47FA66A2-41E5-3B5C-00E0-65400E6B753A}"/>
               </a:ext>
             </a:extLst>
           </p:cNvPr>
@@ -7111,10 +7629,10 @@
         </p:nvGrpSpPr>
         <p:grpSpPr>
           <a:xfrm>
-            <a:off x="1793534" y="234643"/>
-            <a:ext cx="6197243" cy="6388715"/>
-            <a:chOff x="909614" y="234642"/>
-            <a:chExt cx="6197242" cy="6388715"/>
+            <a:off x="2444302" y="234643"/>
+            <a:ext cx="5546475" cy="6388715"/>
+            <a:chOff x="2444302" y="234643"/>
+            <a:chExt cx="5546475" cy="6388715"/>
           </a:xfrm>
         </p:grpSpPr>
         <p:sp>
@@ -7131,14 +7649,14 @@
           </p:nvSpPr>
           <p:spPr>
             <a:xfrm>
-              <a:off x="4199044" y="234642"/>
+              <a:off x="5082965" y="234643"/>
               <a:ext cx="2907812" cy="6388715"/>
             </a:xfrm>
             <a:prstGeom prst="rect">
               <a:avLst/>
             </a:prstGeom>
             <a:solidFill>
-              <a:srgbClr val="4942E4"/>
+              <a:srgbClr val="F9FBE7"/>
             </a:solidFill>
           </p:spPr>
           <p:style>
@@ -7184,7 +7702,7 @@
           </p:nvSpPr>
           <p:spPr>
             <a:xfrm>
-              <a:off x="4551191" y="479696"/>
+              <a:off x="5435112" y="479697"/>
               <a:ext cx="2196850" cy="788894"/>
             </a:xfrm>
             <a:prstGeom prst="ellipse">
@@ -7250,7 +7768,7 @@
           </p:nvSpPr>
           <p:spPr>
             <a:xfrm>
-              <a:off x="4551190" y="1652952"/>
+              <a:off x="5435111" y="1652953"/>
               <a:ext cx="2196851" cy="788894"/>
             </a:xfrm>
             <a:prstGeom prst="ellipse">
@@ -7316,7 +7834,7 @@
           </p:nvSpPr>
           <p:spPr>
             <a:xfrm>
-              <a:off x="4551191" y="2826208"/>
+              <a:off x="5435112" y="2826209"/>
               <a:ext cx="2196850" cy="788894"/>
             </a:xfrm>
             <a:prstGeom prst="ellipse">
@@ -7382,7 +7900,7 @@
           </p:nvSpPr>
           <p:spPr>
             <a:xfrm>
-              <a:off x="4551191" y="3999464"/>
+              <a:off x="5435112" y="3999465"/>
               <a:ext cx="2196850" cy="788894"/>
             </a:xfrm>
             <a:prstGeom prst="ellipse">
@@ -7448,7 +7966,7 @@
           </p:nvSpPr>
           <p:spPr>
             <a:xfrm>
-              <a:off x="4551191" y="5172719"/>
+              <a:off x="5435112" y="5172720"/>
               <a:ext cx="2196850" cy="788894"/>
             </a:xfrm>
             <a:prstGeom prst="ellipse">
@@ -7514,7 +8032,7 @@
           </p:nvSpPr>
           <p:spPr>
             <a:xfrm>
-              <a:off x="1322249" y="4062127"/>
+              <a:off x="2444302" y="4112084"/>
               <a:ext cx="937564" cy="369332"/>
             </a:xfrm>
             <a:prstGeom prst="rect">
@@ -7551,7 +8069,7 @@
           </p:nvGrpSpPr>
           <p:grpSpPr>
             <a:xfrm>
-              <a:off x="2648674" y="874143"/>
+              <a:off x="3532594" y="874144"/>
               <a:ext cx="1902517" cy="4693023"/>
               <a:chOff x="2648674" y="874143"/>
               <a:chExt cx="1902517" cy="4693023"/>
@@ -7830,42 +8348,291 @@
             </p:style>
           </p:cxnSp>
         </p:grpSp>
-        <p:pic>
-          <p:nvPicPr>
-            <p:cNvPr id="6" name="Picture 5">
+        <p:grpSp>
+          <p:nvGrpSpPr>
+            <p:cNvPr id="2" name="Group 1">
               <a:extLst>
                 <a:ext uri="{FF2B5EF4-FFF2-40B4-BE49-F238E27FC236}">
-                  <a16:creationId xmlns:a16="http://schemas.microsoft.com/office/drawing/2014/main" id="{2819DD20-B4A4-0966-2D27-FD7310B38D01}"/>
+                  <a16:creationId xmlns:a16="http://schemas.microsoft.com/office/drawing/2014/main" id="{538330FC-52B5-71FB-E6EA-0F88B0334AC7}"/>
                 </a:ext>
               </a:extLst>
             </p:cNvPr>
-            <p:cNvPicPr>
-              <a:picLocks noChangeAspect="1"/>
-            </p:cNvPicPr>
+            <p:cNvGrpSpPr/>
             <p:nvPr/>
-          </p:nvPicPr>
-          <p:blipFill>
-            <a:blip r:embed="rId2">
-              <a:extLst>
-                <a:ext uri="{28A0092B-C50C-407E-A947-70E740481C1C}">
-                  <a14:useLocalDpi xmlns:a14="http://schemas.microsoft.com/office/drawing/2010/main" val="0"/>
-                </a:ext>
-              </a:extLst>
-            </a:blip>
-            <a:stretch>
-              <a:fillRect/>
-            </a:stretch>
-          </p:blipFill>
-          <p:spPr>
+          </p:nvGrpSpPr>
+          <p:grpSpPr>
             <a:xfrm>
-              <a:off x="909614" y="2339236"/>
-              <a:ext cx="1762836" cy="1762836"/>
+              <a:off x="2565764" y="2252396"/>
+              <a:ext cx="694640" cy="1887305"/>
+              <a:chOff x="890982" y="2252396"/>
+              <a:chExt cx="694640" cy="1887305"/>
             </a:xfrm>
-            <a:prstGeom prst="rect">
-              <a:avLst/>
-            </a:prstGeom>
-          </p:spPr>
-        </p:pic>
+          </p:grpSpPr>
+          <p:sp>
+            <p:nvSpPr>
+              <p:cNvPr id="3" name="Oval 2">
+                <a:extLst>
+                  <a:ext uri="{FF2B5EF4-FFF2-40B4-BE49-F238E27FC236}">
+                    <a16:creationId xmlns:a16="http://schemas.microsoft.com/office/drawing/2014/main" id="{84CE72DE-A5A0-C751-F19A-8AA03388FABC}"/>
+                  </a:ext>
+                </a:extLst>
+              </p:cNvPr>
+              <p:cNvSpPr/>
+              <p:nvPr/>
+            </p:nvSpPr>
+            <p:spPr>
+              <a:xfrm>
+                <a:off x="948301" y="2252396"/>
+                <a:ext cx="581970" cy="581970"/>
+              </a:xfrm>
+              <a:prstGeom prst="ellipse">
+                <a:avLst/>
+              </a:prstGeom>
+              <a:noFill/>
+              <a:ln w="38100">
+                <a:solidFill>
+                  <a:schemeClr val="tx1"/>
+                </a:solidFill>
+              </a:ln>
+            </p:spPr>
+            <p:style>
+              <a:lnRef idx="2">
+                <a:schemeClr val="accent1">
+                  <a:shade val="50000"/>
+                </a:schemeClr>
+              </a:lnRef>
+              <a:fillRef idx="1">
+                <a:schemeClr val="accent1"/>
+              </a:fillRef>
+              <a:effectRef idx="0">
+                <a:schemeClr val="accent1"/>
+              </a:effectRef>
+              <a:fontRef idx="minor">
+                <a:schemeClr val="lt1"/>
+              </a:fontRef>
+            </p:style>
+            <p:txBody>
+              <a:bodyPr rtlCol="0" anchor="ctr"/>
+              <a:lstStyle/>
+              <a:p>
+                <a:pPr algn="ctr"/>
+                <a:endParaRPr lang="en-IN"/>
+              </a:p>
+            </p:txBody>
+          </p:sp>
+          <p:cxnSp>
+            <p:nvCxnSpPr>
+              <p:cNvPr id="7" name="Straight Connector 6">
+                <a:extLst>
+                  <a:ext uri="{FF2B5EF4-FFF2-40B4-BE49-F238E27FC236}">
+                    <a16:creationId xmlns:a16="http://schemas.microsoft.com/office/drawing/2014/main" id="{5796DCB0-55A1-30BB-1B85-4F605B1C4567}"/>
+                  </a:ext>
+                </a:extLst>
+              </p:cNvPr>
+              <p:cNvCxnSpPr>
+                <a:cxnSpLocks/>
+                <a:stCxn id="3" idx="4"/>
+              </p:cNvCxnSpPr>
+              <p:nvPr/>
+            </p:nvCxnSpPr>
+            <p:spPr>
+              <a:xfrm>
+                <a:off x="1239286" y="2834366"/>
+                <a:ext cx="5264" cy="846212"/>
+              </a:xfrm>
+              <a:prstGeom prst="line">
+                <a:avLst/>
+              </a:prstGeom>
+              <a:ln w="57150">
+                <a:solidFill>
+                  <a:schemeClr val="tx1"/>
+                </a:solidFill>
+              </a:ln>
+            </p:spPr>
+            <p:style>
+              <a:lnRef idx="1">
+                <a:schemeClr val="accent1"/>
+              </a:lnRef>
+              <a:fillRef idx="0">
+                <a:schemeClr val="accent1"/>
+              </a:fillRef>
+              <a:effectRef idx="0">
+                <a:schemeClr val="accent1"/>
+              </a:effectRef>
+              <a:fontRef idx="minor">
+                <a:schemeClr val="tx1"/>
+              </a:fontRef>
+            </p:style>
+          </p:cxnSp>
+          <p:cxnSp>
+            <p:nvCxnSpPr>
+              <p:cNvPr id="9" name="Straight Connector 8">
+                <a:extLst>
+                  <a:ext uri="{FF2B5EF4-FFF2-40B4-BE49-F238E27FC236}">
+                    <a16:creationId xmlns:a16="http://schemas.microsoft.com/office/drawing/2014/main" id="{07D9DDDA-DFF4-78BD-D0B9-6CEAA2FC75F6}"/>
+                  </a:ext>
+                </a:extLst>
+              </p:cNvPr>
+              <p:cNvCxnSpPr/>
+              <p:nvPr/>
+            </p:nvCxnSpPr>
+            <p:spPr>
+              <a:xfrm flipH="1">
+                <a:off x="890982" y="3680578"/>
+                <a:ext cx="348304" cy="459123"/>
+              </a:xfrm>
+              <a:prstGeom prst="line">
+                <a:avLst/>
+              </a:prstGeom>
+              <a:ln w="57150">
+                <a:solidFill>
+                  <a:schemeClr val="tx1"/>
+                </a:solidFill>
+              </a:ln>
+            </p:spPr>
+            <p:style>
+              <a:lnRef idx="1">
+                <a:schemeClr val="accent1"/>
+              </a:lnRef>
+              <a:fillRef idx="0">
+                <a:schemeClr val="accent1"/>
+              </a:fillRef>
+              <a:effectRef idx="0">
+                <a:schemeClr val="accent1"/>
+              </a:effectRef>
+              <a:fontRef idx="minor">
+                <a:schemeClr val="tx1"/>
+              </a:fontRef>
+            </p:style>
+          </p:cxnSp>
+          <p:cxnSp>
+            <p:nvCxnSpPr>
+              <p:cNvPr id="10" name="Straight Connector 9">
+                <a:extLst>
+                  <a:ext uri="{FF2B5EF4-FFF2-40B4-BE49-F238E27FC236}">
+                    <a16:creationId xmlns:a16="http://schemas.microsoft.com/office/drawing/2014/main" id="{20FBD0AC-C57A-4378-0C3D-7B58A87639E6}"/>
+                  </a:ext>
+                </a:extLst>
+              </p:cNvPr>
+              <p:cNvCxnSpPr>
+                <a:cxnSpLocks/>
+              </p:cNvCxnSpPr>
+              <p:nvPr/>
+            </p:nvCxnSpPr>
+            <p:spPr>
+              <a:xfrm>
+                <a:off x="1237318" y="3680578"/>
+                <a:ext cx="348304" cy="459123"/>
+              </a:xfrm>
+              <a:prstGeom prst="line">
+                <a:avLst/>
+              </a:prstGeom>
+              <a:ln w="57150">
+                <a:solidFill>
+                  <a:schemeClr val="tx1"/>
+                </a:solidFill>
+              </a:ln>
+            </p:spPr>
+            <p:style>
+              <a:lnRef idx="1">
+                <a:schemeClr val="accent1"/>
+              </a:lnRef>
+              <a:fillRef idx="0">
+                <a:schemeClr val="accent1"/>
+              </a:fillRef>
+              <a:effectRef idx="0">
+                <a:schemeClr val="accent1"/>
+              </a:effectRef>
+              <a:fontRef idx="minor">
+                <a:schemeClr val="tx1"/>
+              </a:fontRef>
+            </p:style>
+          </p:cxnSp>
+          <p:cxnSp>
+            <p:nvCxnSpPr>
+              <p:cNvPr id="11" name="Straight Connector 10">
+                <a:extLst>
+                  <a:ext uri="{FF2B5EF4-FFF2-40B4-BE49-F238E27FC236}">
+                    <a16:creationId xmlns:a16="http://schemas.microsoft.com/office/drawing/2014/main" id="{33E56702-FE49-3871-AD6D-1D126D55B97F}"/>
+                  </a:ext>
+                </a:extLst>
+              </p:cNvPr>
+              <p:cNvCxnSpPr/>
+              <p:nvPr/>
+            </p:nvCxnSpPr>
+            <p:spPr>
+              <a:xfrm flipH="1">
+                <a:off x="890982" y="3031746"/>
+                <a:ext cx="348304" cy="459123"/>
+              </a:xfrm>
+              <a:prstGeom prst="line">
+                <a:avLst/>
+              </a:prstGeom>
+              <a:ln w="57150">
+                <a:solidFill>
+                  <a:schemeClr val="tx1"/>
+                </a:solidFill>
+              </a:ln>
+            </p:spPr>
+            <p:style>
+              <a:lnRef idx="1">
+                <a:schemeClr val="accent1"/>
+              </a:lnRef>
+              <a:fillRef idx="0">
+                <a:schemeClr val="accent1"/>
+              </a:fillRef>
+              <a:effectRef idx="0">
+                <a:schemeClr val="accent1"/>
+              </a:effectRef>
+              <a:fontRef idx="minor">
+                <a:schemeClr val="tx1"/>
+              </a:fontRef>
+            </p:style>
+          </p:cxnSp>
+          <p:cxnSp>
+            <p:nvCxnSpPr>
+              <p:cNvPr id="12" name="Straight Connector 11">
+                <a:extLst>
+                  <a:ext uri="{FF2B5EF4-FFF2-40B4-BE49-F238E27FC236}">
+                    <a16:creationId xmlns:a16="http://schemas.microsoft.com/office/drawing/2014/main" id="{E5CED594-B92C-2EC8-D84D-28A69E57B297}"/>
+                  </a:ext>
+                </a:extLst>
+              </p:cNvPr>
+              <p:cNvCxnSpPr>
+                <a:cxnSpLocks/>
+              </p:cNvCxnSpPr>
+              <p:nvPr/>
+            </p:nvCxnSpPr>
+            <p:spPr>
+              <a:xfrm>
+                <a:off x="1237318" y="3031746"/>
+                <a:ext cx="348304" cy="459123"/>
+              </a:xfrm>
+              <a:prstGeom prst="line">
+                <a:avLst/>
+              </a:prstGeom>
+              <a:ln w="57150">
+                <a:solidFill>
+                  <a:schemeClr val="tx1"/>
+                </a:solidFill>
+              </a:ln>
+            </p:spPr>
+            <p:style>
+              <a:lnRef idx="1">
+                <a:schemeClr val="accent1"/>
+              </a:lnRef>
+              <a:fillRef idx="0">
+                <a:schemeClr val="accent1"/>
+              </a:fillRef>
+              <a:effectRef idx="0">
+                <a:schemeClr val="accent1"/>
+              </a:effectRef>
+              <a:fontRef idx="minor">
+                <a:schemeClr val="tx1"/>
+              </a:fontRef>
+            </p:style>
+          </p:cxnSp>
+        </p:grpSp>
       </p:grpSp>
     </p:spTree>
     <p:extLst>
@@ -22778,6 +23545,1049 @@
           <a:chExt cx="0" cy="0"/>
         </a:xfrm>
       </p:grpSpPr>
+      <p:pic>
+        <p:nvPicPr>
+          <p:cNvPr id="2049" name="DefaultOcx">
+            <a:extLst>
+              <a:ext uri="{FF2B5EF4-FFF2-40B4-BE49-F238E27FC236}">
+                <a16:creationId xmlns:a16="http://schemas.microsoft.com/office/drawing/2014/main" id="{F9939D60-8E39-1356-CADC-90C5E56BFC44}"/>
+              </a:ext>
+            </a:extLst>
+          </p:cNvPr>
+          <p:cNvPicPr preferRelativeResize="0">
+            <a:picLocks noChangeArrowheads="1" noChangeShapeType="1"/>
+          </p:cNvPicPr>
+          <p:nvPr/>
+        </p:nvPicPr>
+        <p:blipFill>
+          <a:blip r:embed="rId2">
+            <a:extLst>
+              <a:ext uri="{28A0092B-C50C-407E-A947-70E740481C1C}">
+                <a14:useLocalDpi xmlns:a14="http://schemas.microsoft.com/office/drawing/2010/main" val="0"/>
+              </a:ext>
+            </a:extLst>
+          </a:blip>
+          <a:srcRect/>
+          <a:stretch>
+            <a:fillRect/>
+          </a:stretch>
+        </p:blipFill>
+        <p:spPr bwMode="auto">
+          <a:xfrm>
+            <a:off x="0" y="0"/>
+            <a:ext cx="1371600" cy="274638"/>
+          </a:xfrm>
+          <a:prstGeom prst="rect">
+            <a:avLst/>
+          </a:prstGeom>
+          <a:noFill/>
+          <a:ln w="9525">
+            <a:miter lim="800000"/>
+            <a:headEnd/>
+            <a:tailEnd/>
+          </a:ln>
+          <a:effectLst/>
+          <a:extLst>
+            <a:ext uri="{AF507438-7753-43E0-B8FC-AC1667EBCBE1}">
+              <a14:hiddenEffects xmlns:a14="http://schemas.microsoft.com/office/drawing/2010/main">
+                <a:effectLst>
+                  <a:outerShdw dist="35921" dir="2700000" algn="ctr" rotWithShape="0">
+                    <a:schemeClr val="bg2"/>
+                  </a:outerShdw>
+                </a:effectLst>
+              </a14:hiddenEffects>
+            </a:ext>
+          </a:extLst>
+        </p:spPr>
+      </p:pic>
+      <p:pic>
+        <p:nvPicPr>
+          <p:cNvPr id="2050" name="Picture 2" descr="Primary">
+            <a:extLst>
+              <a:ext uri="{FF2B5EF4-FFF2-40B4-BE49-F238E27FC236}">
+                <a16:creationId xmlns:a16="http://schemas.microsoft.com/office/drawing/2014/main" id="{20258C41-DDE2-7D59-25D2-BA599CF0B09B}"/>
+              </a:ext>
+            </a:extLst>
+          </p:cNvPr>
+          <p:cNvPicPr>
+            <a:picLocks noChangeAspect="1" noChangeArrowheads="1"/>
+          </p:cNvPicPr>
+          <p:nvPr/>
+        </p:nvPicPr>
+        <p:blipFill>
+          <a:blip r:embed="rId3">
+            <a:extLst>
+              <a:ext uri="{28A0092B-C50C-407E-A947-70E740481C1C}">
+                <a14:useLocalDpi xmlns:a14="http://schemas.microsoft.com/office/drawing/2010/main" val="0"/>
+              </a:ext>
+            </a:extLst>
+          </a:blip>
+          <a:srcRect/>
+          <a:stretch>
+            <a:fillRect/>
+          </a:stretch>
+        </p:blipFill>
+        <p:spPr bwMode="auto">
+          <a:xfrm>
+            <a:off x="0" y="0"/>
+            <a:ext cx="9525" cy="9525"/>
+          </a:xfrm>
+          <a:prstGeom prst="rect">
+            <a:avLst/>
+          </a:prstGeom>
+          <a:noFill/>
+          <a:extLst>
+            <a:ext uri="{909E8E84-426E-40DD-AFC4-6F175D3DCCD1}">
+              <a14:hiddenFill xmlns:a14="http://schemas.microsoft.com/office/drawing/2010/main">
+                <a:solidFill>
+                  <a:srgbClr val="FFFFFF"/>
+                </a:solidFill>
+              </a14:hiddenFill>
+            </a:ext>
+          </a:extLst>
+        </p:spPr>
+      </p:pic>
+      <p:pic>
+        <p:nvPicPr>
+          <p:cNvPr id="2051" name="Picture 3" descr="Change">
+            <a:extLst>
+              <a:ext uri="{FF2B5EF4-FFF2-40B4-BE49-F238E27FC236}">
+                <a16:creationId xmlns:a16="http://schemas.microsoft.com/office/drawing/2014/main" id="{29A799B8-CF19-171F-D997-CA2E12E5C1DB}"/>
+              </a:ext>
+            </a:extLst>
+          </p:cNvPr>
+          <p:cNvPicPr>
+            <a:picLocks noChangeAspect="1" noChangeArrowheads="1"/>
+          </p:cNvPicPr>
+          <p:nvPr/>
+        </p:nvPicPr>
+        <p:blipFill>
+          <a:blip r:embed="rId3">
+            <a:extLst>
+              <a:ext uri="{28A0092B-C50C-407E-A947-70E740481C1C}">
+                <a14:useLocalDpi xmlns:a14="http://schemas.microsoft.com/office/drawing/2010/main" val="0"/>
+              </a:ext>
+            </a:extLst>
+          </a:blip>
+          <a:srcRect/>
+          <a:stretch>
+            <a:fillRect/>
+          </a:stretch>
+        </p:blipFill>
+        <p:spPr bwMode="auto">
+          <a:xfrm>
+            <a:off x="0" y="0"/>
+            <a:ext cx="9525" cy="9525"/>
+          </a:xfrm>
+          <a:prstGeom prst="rect">
+            <a:avLst/>
+          </a:prstGeom>
+          <a:noFill/>
+          <a:extLst>
+            <a:ext uri="{909E8E84-426E-40DD-AFC4-6F175D3DCCD1}">
+              <a14:hiddenFill xmlns:a14="http://schemas.microsoft.com/office/drawing/2010/main">
+                <a:solidFill>
+                  <a:srgbClr val="FFFFFF"/>
+                </a:solidFill>
+              </a14:hiddenFill>
+            </a:ext>
+          </a:extLst>
+        </p:spPr>
+      </p:pic>
+      <p:pic>
+        <p:nvPicPr>
+          <p:cNvPr id="2052" name="Picture 4" descr="Drop">
+            <a:extLst>
+              <a:ext uri="{FF2B5EF4-FFF2-40B4-BE49-F238E27FC236}">
+                <a16:creationId xmlns:a16="http://schemas.microsoft.com/office/drawing/2014/main" id="{5D6DFB5F-5061-D1B5-B300-EBB04D762AD5}"/>
+              </a:ext>
+            </a:extLst>
+          </p:cNvPr>
+          <p:cNvPicPr>
+            <a:picLocks noChangeAspect="1" noChangeArrowheads="1"/>
+          </p:cNvPicPr>
+          <p:nvPr/>
+        </p:nvPicPr>
+        <p:blipFill>
+          <a:blip r:embed="rId3">
+            <a:extLst>
+              <a:ext uri="{28A0092B-C50C-407E-A947-70E740481C1C}">
+                <a14:useLocalDpi xmlns:a14="http://schemas.microsoft.com/office/drawing/2010/main" val="0"/>
+              </a:ext>
+            </a:extLst>
+          </a:blip>
+          <a:srcRect/>
+          <a:stretch>
+            <a:fillRect/>
+          </a:stretch>
+        </p:blipFill>
+        <p:spPr bwMode="auto">
+          <a:xfrm>
+            <a:off x="0" y="0"/>
+            <a:ext cx="9525" cy="9525"/>
+          </a:xfrm>
+          <a:prstGeom prst="rect">
+            <a:avLst/>
+          </a:prstGeom>
+          <a:noFill/>
+          <a:extLst>
+            <a:ext uri="{909E8E84-426E-40DD-AFC4-6F175D3DCCD1}">
+              <a14:hiddenFill xmlns:a14="http://schemas.microsoft.com/office/drawing/2010/main">
+                <a:solidFill>
+                  <a:srgbClr val="FFFFFF"/>
+                </a:solidFill>
+              </a14:hiddenFill>
+            </a:ext>
+          </a:extLst>
+        </p:spPr>
+      </p:pic>
+      <p:pic>
+        <p:nvPicPr>
+          <p:cNvPr id="2053" name="HTMLCheckbox1">
+            <a:extLst>
+              <a:ext uri="{FF2B5EF4-FFF2-40B4-BE49-F238E27FC236}">
+                <a16:creationId xmlns:a16="http://schemas.microsoft.com/office/drawing/2014/main" id="{F444FF57-8E72-4AB9-3C9B-4AB00C1B4D0F}"/>
+              </a:ext>
+            </a:extLst>
+          </p:cNvPr>
+          <p:cNvPicPr preferRelativeResize="0">
+            <a:picLocks noChangeArrowheads="1" noChangeShapeType="1"/>
+          </p:cNvPicPr>
+          <p:nvPr/>
+        </p:nvPicPr>
+        <p:blipFill>
+          <a:blip r:embed="rId2">
+            <a:extLst>
+              <a:ext uri="{28A0092B-C50C-407E-A947-70E740481C1C}">
+                <a14:useLocalDpi xmlns:a14="http://schemas.microsoft.com/office/drawing/2010/main" val="0"/>
+              </a:ext>
+            </a:extLst>
+          </a:blip>
+          <a:srcRect/>
+          <a:stretch>
+            <a:fillRect/>
+          </a:stretch>
+        </p:blipFill>
+        <p:spPr bwMode="auto">
+          <a:xfrm>
+            <a:off x="0" y="0"/>
+            <a:ext cx="1371600" cy="274638"/>
+          </a:xfrm>
+          <a:prstGeom prst="rect">
+            <a:avLst/>
+          </a:prstGeom>
+          <a:noFill/>
+          <a:ln w="9525">
+            <a:miter lim="800000"/>
+            <a:headEnd/>
+            <a:tailEnd/>
+          </a:ln>
+          <a:effectLst/>
+          <a:extLst>
+            <a:ext uri="{AF507438-7753-43E0-B8FC-AC1667EBCBE1}">
+              <a14:hiddenEffects xmlns:a14="http://schemas.microsoft.com/office/drawing/2010/main">
+                <a:effectLst>
+                  <a:outerShdw dist="35921" dir="2700000" algn="ctr" rotWithShape="0">
+                    <a:schemeClr val="bg2"/>
+                  </a:outerShdw>
+                </a:effectLst>
+              </a14:hiddenEffects>
+            </a:ext>
+          </a:extLst>
+        </p:spPr>
+      </p:pic>
+      <p:pic>
+        <p:nvPicPr>
+          <p:cNvPr id="2054" name="Picture 6" descr="Index">
+            <a:extLst>
+              <a:ext uri="{FF2B5EF4-FFF2-40B4-BE49-F238E27FC236}">
+                <a16:creationId xmlns:a16="http://schemas.microsoft.com/office/drawing/2014/main" id="{4D8AD3C9-0708-BF5C-A1C3-768B82A43F12}"/>
+              </a:ext>
+            </a:extLst>
+          </p:cNvPr>
+          <p:cNvPicPr>
+            <a:picLocks noChangeAspect="1" noChangeArrowheads="1"/>
+          </p:cNvPicPr>
+          <p:nvPr/>
+        </p:nvPicPr>
+        <p:blipFill>
+          <a:blip r:embed="rId3">
+            <a:extLst>
+              <a:ext uri="{28A0092B-C50C-407E-A947-70E740481C1C}">
+                <a14:useLocalDpi xmlns:a14="http://schemas.microsoft.com/office/drawing/2010/main" val="0"/>
+              </a:ext>
+            </a:extLst>
+          </a:blip>
+          <a:srcRect/>
+          <a:stretch>
+            <a:fillRect/>
+          </a:stretch>
+        </p:blipFill>
+        <p:spPr bwMode="auto">
+          <a:xfrm>
+            <a:off x="0" y="0"/>
+            <a:ext cx="9525" cy="9525"/>
+          </a:xfrm>
+          <a:prstGeom prst="rect">
+            <a:avLst/>
+          </a:prstGeom>
+          <a:noFill/>
+          <a:extLst>
+            <a:ext uri="{909E8E84-426E-40DD-AFC4-6F175D3DCCD1}">
+              <a14:hiddenFill xmlns:a14="http://schemas.microsoft.com/office/drawing/2010/main">
+                <a:solidFill>
+                  <a:srgbClr val="FFFFFF"/>
+                </a:solidFill>
+              </a14:hiddenFill>
+            </a:ext>
+          </a:extLst>
+        </p:spPr>
+      </p:pic>
+      <p:pic>
+        <p:nvPicPr>
+          <p:cNvPr id="2055" name="Picture 7" descr="Change">
+            <a:extLst>
+              <a:ext uri="{FF2B5EF4-FFF2-40B4-BE49-F238E27FC236}">
+                <a16:creationId xmlns:a16="http://schemas.microsoft.com/office/drawing/2014/main" id="{06D262E8-1EB2-F003-7C24-42005634BE19}"/>
+              </a:ext>
+            </a:extLst>
+          </p:cNvPr>
+          <p:cNvPicPr>
+            <a:picLocks noChangeAspect="1" noChangeArrowheads="1"/>
+          </p:cNvPicPr>
+          <p:nvPr/>
+        </p:nvPicPr>
+        <p:blipFill>
+          <a:blip r:embed="rId3">
+            <a:extLst>
+              <a:ext uri="{28A0092B-C50C-407E-A947-70E740481C1C}">
+                <a14:useLocalDpi xmlns:a14="http://schemas.microsoft.com/office/drawing/2010/main" val="0"/>
+              </a:ext>
+            </a:extLst>
+          </a:blip>
+          <a:srcRect/>
+          <a:stretch>
+            <a:fillRect/>
+          </a:stretch>
+        </p:blipFill>
+        <p:spPr bwMode="auto">
+          <a:xfrm>
+            <a:off x="0" y="0"/>
+            <a:ext cx="9525" cy="9525"/>
+          </a:xfrm>
+          <a:prstGeom prst="rect">
+            <a:avLst/>
+          </a:prstGeom>
+          <a:noFill/>
+          <a:extLst>
+            <a:ext uri="{909E8E84-426E-40DD-AFC4-6F175D3DCCD1}">
+              <a14:hiddenFill xmlns:a14="http://schemas.microsoft.com/office/drawing/2010/main">
+                <a:solidFill>
+                  <a:srgbClr val="FFFFFF"/>
+                </a:solidFill>
+              </a14:hiddenFill>
+            </a:ext>
+          </a:extLst>
+        </p:spPr>
+      </p:pic>
+      <p:pic>
+        <p:nvPicPr>
+          <p:cNvPr id="2056" name="Picture 8" descr="Drop">
+            <a:extLst>
+              <a:ext uri="{FF2B5EF4-FFF2-40B4-BE49-F238E27FC236}">
+                <a16:creationId xmlns:a16="http://schemas.microsoft.com/office/drawing/2014/main" id="{047AF02E-31F2-2CD9-9576-36003BB91F13}"/>
+              </a:ext>
+            </a:extLst>
+          </p:cNvPr>
+          <p:cNvPicPr>
+            <a:picLocks noChangeAspect="1" noChangeArrowheads="1"/>
+          </p:cNvPicPr>
+          <p:nvPr/>
+        </p:nvPicPr>
+        <p:blipFill>
+          <a:blip r:embed="rId3">
+            <a:extLst>
+              <a:ext uri="{28A0092B-C50C-407E-A947-70E740481C1C}">
+                <a14:useLocalDpi xmlns:a14="http://schemas.microsoft.com/office/drawing/2010/main" val="0"/>
+              </a:ext>
+            </a:extLst>
+          </a:blip>
+          <a:srcRect/>
+          <a:stretch>
+            <a:fillRect/>
+          </a:stretch>
+        </p:blipFill>
+        <p:spPr bwMode="auto">
+          <a:xfrm>
+            <a:off x="0" y="0"/>
+            <a:ext cx="9525" cy="9525"/>
+          </a:xfrm>
+          <a:prstGeom prst="rect">
+            <a:avLst/>
+          </a:prstGeom>
+          <a:noFill/>
+          <a:extLst>
+            <a:ext uri="{909E8E84-426E-40DD-AFC4-6F175D3DCCD1}">
+              <a14:hiddenFill xmlns:a14="http://schemas.microsoft.com/office/drawing/2010/main">
+                <a:solidFill>
+                  <a:srgbClr val="FFFFFF"/>
+                </a:solidFill>
+              </a14:hiddenFill>
+            </a:ext>
+          </a:extLst>
+        </p:spPr>
+      </p:pic>
+      <p:pic>
+        <p:nvPicPr>
+          <p:cNvPr id="2057" name="HTMLCheckbox2">
+            <a:extLst>
+              <a:ext uri="{FF2B5EF4-FFF2-40B4-BE49-F238E27FC236}">
+                <a16:creationId xmlns:a16="http://schemas.microsoft.com/office/drawing/2014/main" id="{7C9EB018-EE83-3AC9-E88D-D0DE826FEB51}"/>
+              </a:ext>
+            </a:extLst>
+          </p:cNvPr>
+          <p:cNvPicPr preferRelativeResize="0">
+            <a:picLocks noChangeArrowheads="1" noChangeShapeType="1"/>
+          </p:cNvPicPr>
+          <p:nvPr/>
+        </p:nvPicPr>
+        <p:blipFill>
+          <a:blip r:embed="rId2">
+            <a:extLst>
+              <a:ext uri="{28A0092B-C50C-407E-A947-70E740481C1C}">
+                <a14:useLocalDpi xmlns:a14="http://schemas.microsoft.com/office/drawing/2010/main" val="0"/>
+              </a:ext>
+            </a:extLst>
+          </a:blip>
+          <a:srcRect/>
+          <a:stretch>
+            <a:fillRect/>
+          </a:stretch>
+        </p:blipFill>
+        <p:spPr bwMode="auto">
+          <a:xfrm>
+            <a:off x="0" y="0"/>
+            <a:ext cx="1371600" cy="274638"/>
+          </a:xfrm>
+          <a:prstGeom prst="rect">
+            <a:avLst/>
+          </a:prstGeom>
+          <a:noFill/>
+          <a:ln w="9525">
+            <a:miter lim="800000"/>
+            <a:headEnd/>
+            <a:tailEnd/>
+          </a:ln>
+          <a:effectLst/>
+          <a:extLst>
+            <a:ext uri="{AF507438-7753-43E0-B8FC-AC1667EBCBE1}">
+              <a14:hiddenEffects xmlns:a14="http://schemas.microsoft.com/office/drawing/2010/main">
+                <a:effectLst>
+                  <a:outerShdw dist="35921" dir="2700000" algn="ctr" rotWithShape="0">
+                    <a:schemeClr val="bg2"/>
+                  </a:outerShdw>
+                </a:effectLst>
+              </a14:hiddenEffects>
+            </a:ext>
+          </a:extLst>
+        </p:spPr>
+      </p:pic>
+      <p:pic>
+        <p:nvPicPr>
+          <p:cNvPr id="2058" name="Picture 10" descr="Change">
+            <a:extLst>
+              <a:ext uri="{FF2B5EF4-FFF2-40B4-BE49-F238E27FC236}">
+                <a16:creationId xmlns:a16="http://schemas.microsoft.com/office/drawing/2014/main" id="{785492B8-CBDE-A9BF-E2C8-0BFC610DA389}"/>
+              </a:ext>
+            </a:extLst>
+          </p:cNvPr>
+          <p:cNvPicPr>
+            <a:picLocks noChangeAspect="1" noChangeArrowheads="1"/>
+          </p:cNvPicPr>
+          <p:nvPr/>
+        </p:nvPicPr>
+        <p:blipFill>
+          <a:blip r:embed="rId3">
+            <a:extLst>
+              <a:ext uri="{28A0092B-C50C-407E-A947-70E740481C1C}">
+                <a14:useLocalDpi xmlns:a14="http://schemas.microsoft.com/office/drawing/2010/main" val="0"/>
+              </a:ext>
+            </a:extLst>
+          </a:blip>
+          <a:srcRect/>
+          <a:stretch>
+            <a:fillRect/>
+          </a:stretch>
+        </p:blipFill>
+        <p:spPr bwMode="auto">
+          <a:xfrm>
+            <a:off x="0" y="0"/>
+            <a:ext cx="9525" cy="9525"/>
+          </a:xfrm>
+          <a:prstGeom prst="rect">
+            <a:avLst/>
+          </a:prstGeom>
+          <a:noFill/>
+          <a:extLst>
+            <a:ext uri="{909E8E84-426E-40DD-AFC4-6F175D3DCCD1}">
+              <a14:hiddenFill xmlns:a14="http://schemas.microsoft.com/office/drawing/2010/main">
+                <a:solidFill>
+                  <a:srgbClr val="FFFFFF"/>
+                </a:solidFill>
+              </a14:hiddenFill>
+            </a:ext>
+          </a:extLst>
+        </p:spPr>
+      </p:pic>
+      <p:pic>
+        <p:nvPicPr>
+          <p:cNvPr id="2059" name="Picture 11" descr="Drop">
+            <a:extLst>
+              <a:ext uri="{FF2B5EF4-FFF2-40B4-BE49-F238E27FC236}">
+                <a16:creationId xmlns:a16="http://schemas.microsoft.com/office/drawing/2014/main" id="{739BE778-4C9A-6836-386D-91DC5665EF95}"/>
+              </a:ext>
+            </a:extLst>
+          </p:cNvPr>
+          <p:cNvPicPr>
+            <a:picLocks noChangeAspect="1" noChangeArrowheads="1"/>
+          </p:cNvPicPr>
+          <p:nvPr/>
+        </p:nvPicPr>
+        <p:blipFill>
+          <a:blip r:embed="rId3">
+            <a:extLst>
+              <a:ext uri="{28A0092B-C50C-407E-A947-70E740481C1C}">
+                <a14:useLocalDpi xmlns:a14="http://schemas.microsoft.com/office/drawing/2010/main" val="0"/>
+              </a:ext>
+            </a:extLst>
+          </a:blip>
+          <a:srcRect/>
+          <a:stretch>
+            <a:fillRect/>
+          </a:stretch>
+        </p:blipFill>
+        <p:spPr bwMode="auto">
+          <a:xfrm>
+            <a:off x="0" y="0"/>
+            <a:ext cx="9525" cy="9525"/>
+          </a:xfrm>
+          <a:prstGeom prst="rect">
+            <a:avLst/>
+          </a:prstGeom>
+          <a:noFill/>
+          <a:extLst>
+            <a:ext uri="{909E8E84-426E-40DD-AFC4-6F175D3DCCD1}">
+              <a14:hiddenFill xmlns:a14="http://schemas.microsoft.com/office/drawing/2010/main">
+                <a:solidFill>
+                  <a:srgbClr val="FFFFFF"/>
+                </a:solidFill>
+              </a14:hiddenFill>
+            </a:ext>
+          </a:extLst>
+        </p:spPr>
+      </p:pic>
+      <p:pic>
+        <p:nvPicPr>
+          <p:cNvPr id="2060" name="HTMLCheckbox3">
+            <a:extLst>
+              <a:ext uri="{FF2B5EF4-FFF2-40B4-BE49-F238E27FC236}">
+                <a16:creationId xmlns:a16="http://schemas.microsoft.com/office/drawing/2014/main" id="{D18612B9-AD24-9367-0DAE-1387862D1314}"/>
+              </a:ext>
+            </a:extLst>
+          </p:cNvPr>
+          <p:cNvPicPr preferRelativeResize="0">
+            <a:picLocks noChangeArrowheads="1" noChangeShapeType="1"/>
+          </p:cNvPicPr>
+          <p:nvPr/>
+        </p:nvPicPr>
+        <p:blipFill>
+          <a:blip r:embed="rId2">
+            <a:extLst>
+              <a:ext uri="{28A0092B-C50C-407E-A947-70E740481C1C}">
+                <a14:useLocalDpi xmlns:a14="http://schemas.microsoft.com/office/drawing/2010/main" val="0"/>
+              </a:ext>
+            </a:extLst>
+          </a:blip>
+          <a:srcRect/>
+          <a:stretch>
+            <a:fillRect/>
+          </a:stretch>
+        </p:blipFill>
+        <p:spPr bwMode="auto">
+          <a:xfrm>
+            <a:off x="0" y="0"/>
+            <a:ext cx="1371600" cy="274638"/>
+          </a:xfrm>
+          <a:prstGeom prst="rect">
+            <a:avLst/>
+          </a:prstGeom>
+          <a:noFill/>
+          <a:ln w="9525">
+            <a:miter lim="800000"/>
+            <a:headEnd/>
+            <a:tailEnd/>
+          </a:ln>
+          <a:effectLst/>
+          <a:extLst>
+            <a:ext uri="{AF507438-7753-43E0-B8FC-AC1667EBCBE1}">
+              <a14:hiddenEffects xmlns:a14="http://schemas.microsoft.com/office/drawing/2010/main">
+                <a:effectLst>
+                  <a:outerShdw dist="35921" dir="2700000" algn="ctr" rotWithShape="0">
+                    <a:schemeClr val="bg2"/>
+                  </a:outerShdw>
+                </a:effectLst>
+              </a14:hiddenEffects>
+            </a:ext>
+          </a:extLst>
+        </p:spPr>
+      </p:pic>
+      <p:pic>
+        <p:nvPicPr>
+          <p:cNvPr id="2061" name="Picture 13" descr="Change">
+            <a:extLst>
+              <a:ext uri="{FF2B5EF4-FFF2-40B4-BE49-F238E27FC236}">
+                <a16:creationId xmlns:a16="http://schemas.microsoft.com/office/drawing/2014/main" id="{27C5A737-412E-1382-25C2-AECFE1D752D9}"/>
+              </a:ext>
+            </a:extLst>
+          </p:cNvPr>
+          <p:cNvPicPr>
+            <a:picLocks noChangeAspect="1" noChangeArrowheads="1"/>
+          </p:cNvPicPr>
+          <p:nvPr/>
+        </p:nvPicPr>
+        <p:blipFill>
+          <a:blip r:embed="rId3">
+            <a:extLst>
+              <a:ext uri="{28A0092B-C50C-407E-A947-70E740481C1C}">
+                <a14:useLocalDpi xmlns:a14="http://schemas.microsoft.com/office/drawing/2010/main" val="0"/>
+              </a:ext>
+            </a:extLst>
+          </a:blip>
+          <a:srcRect/>
+          <a:stretch>
+            <a:fillRect/>
+          </a:stretch>
+        </p:blipFill>
+        <p:spPr bwMode="auto">
+          <a:xfrm>
+            <a:off x="0" y="0"/>
+            <a:ext cx="9525" cy="9525"/>
+          </a:xfrm>
+          <a:prstGeom prst="rect">
+            <a:avLst/>
+          </a:prstGeom>
+          <a:noFill/>
+          <a:extLst>
+            <a:ext uri="{909E8E84-426E-40DD-AFC4-6F175D3DCCD1}">
+              <a14:hiddenFill xmlns:a14="http://schemas.microsoft.com/office/drawing/2010/main">
+                <a:solidFill>
+                  <a:srgbClr val="FFFFFF"/>
+                </a:solidFill>
+              </a14:hiddenFill>
+            </a:ext>
+          </a:extLst>
+        </p:spPr>
+      </p:pic>
+      <p:pic>
+        <p:nvPicPr>
+          <p:cNvPr id="2062" name="Picture 14" descr="Drop">
+            <a:extLst>
+              <a:ext uri="{FF2B5EF4-FFF2-40B4-BE49-F238E27FC236}">
+                <a16:creationId xmlns:a16="http://schemas.microsoft.com/office/drawing/2014/main" id="{4CCE2DB7-5E8B-829E-510A-EB94B9497E47}"/>
+              </a:ext>
+            </a:extLst>
+          </p:cNvPr>
+          <p:cNvPicPr>
+            <a:picLocks noChangeAspect="1" noChangeArrowheads="1"/>
+          </p:cNvPicPr>
+          <p:nvPr/>
+        </p:nvPicPr>
+        <p:blipFill>
+          <a:blip r:embed="rId3">
+            <a:extLst>
+              <a:ext uri="{28A0092B-C50C-407E-A947-70E740481C1C}">
+                <a14:useLocalDpi xmlns:a14="http://schemas.microsoft.com/office/drawing/2010/main" val="0"/>
+              </a:ext>
+            </a:extLst>
+          </a:blip>
+          <a:srcRect/>
+          <a:stretch>
+            <a:fillRect/>
+          </a:stretch>
+        </p:blipFill>
+        <p:spPr bwMode="auto">
+          <a:xfrm>
+            <a:off x="0" y="0"/>
+            <a:ext cx="9525" cy="9525"/>
+          </a:xfrm>
+          <a:prstGeom prst="rect">
+            <a:avLst/>
+          </a:prstGeom>
+          <a:noFill/>
+          <a:extLst>
+            <a:ext uri="{909E8E84-426E-40DD-AFC4-6F175D3DCCD1}">
+              <a14:hiddenFill xmlns:a14="http://schemas.microsoft.com/office/drawing/2010/main">
+                <a:solidFill>
+                  <a:srgbClr val="FFFFFF"/>
+                </a:solidFill>
+              </a14:hiddenFill>
+            </a:ext>
+          </a:extLst>
+        </p:spPr>
+      </p:pic>
+      <p:pic>
+        <p:nvPicPr>
+          <p:cNvPr id="2063" name="HTMLCheckbox4">
+            <a:extLst>
+              <a:ext uri="{FF2B5EF4-FFF2-40B4-BE49-F238E27FC236}">
+                <a16:creationId xmlns:a16="http://schemas.microsoft.com/office/drawing/2014/main" id="{BA3B8463-4E3B-4C62-D1D7-205765D192DD}"/>
+              </a:ext>
+            </a:extLst>
+          </p:cNvPr>
+          <p:cNvPicPr preferRelativeResize="0">
+            <a:picLocks noChangeArrowheads="1" noChangeShapeType="1"/>
+          </p:cNvPicPr>
+          <p:nvPr/>
+        </p:nvPicPr>
+        <p:blipFill>
+          <a:blip r:embed="rId2">
+            <a:extLst>
+              <a:ext uri="{28A0092B-C50C-407E-A947-70E740481C1C}">
+                <a14:useLocalDpi xmlns:a14="http://schemas.microsoft.com/office/drawing/2010/main" val="0"/>
+              </a:ext>
+            </a:extLst>
+          </a:blip>
+          <a:srcRect/>
+          <a:stretch>
+            <a:fillRect/>
+          </a:stretch>
+        </p:blipFill>
+        <p:spPr bwMode="auto">
+          <a:xfrm>
+            <a:off x="0" y="0"/>
+            <a:ext cx="1371600" cy="274638"/>
+          </a:xfrm>
+          <a:prstGeom prst="rect">
+            <a:avLst/>
+          </a:prstGeom>
+          <a:noFill/>
+          <a:ln w="9525">
+            <a:miter lim="800000"/>
+            <a:headEnd/>
+            <a:tailEnd/>
+          </a:ln>
+          <a:effectLst/>
+          <a:extLst>
+            <a:ext uri="{AF507438-7753-43E0-B8FC-AC1667EBCBE1}">
+              <a14:hiddenEffects xmlns:a14="http://schemas.microsoft.com/office/drawing/2010/main">
+                <a:effectLst>
+                  <a:outerShdw dist="35921" dir="2700000" algn="ctr" rotWithShape="0">
+                    <a:schemeClr val="bg2"/>
+                  </a:outerShdw>
+                </a:effectLst>
+              </a14:hiddenEffects>
+            </a:ext>
+          </a:extLst>
+        </p:spPr>
+      </p:pic>
+      <p:pic>
+        <p:nvPicPr>
+          <p:cNvPr id="2064" name="Picture 16" descr="Change">
+            <a:extLst>
+              <a:ext uri="{FF2B5EF4-FFF2-40B4-BE49-F238E27FC236}">
+                <a16:creationId xmlns:a16="http://schemas.microsoft.com/office/drawing/2014/main" id="{E6FA4987-DC4F-8636-8D3A-0D9D806E2161}"/>
+              </a:ext>
+            </a:extLst>
+          </p:cNvPr>
+          <p:cNvPicPr>
+            <a:picLocks noChangeAspect="1" noChangeArrowheads="1"/>
+          </p:cNvPicPr>
+          <p:nvPr/>
+        </p:nvPicPr>
+        <p:blipFill>
+          <a:blip r:embed="rId3">
+            <a:extLst>
+              <a:ext uri="{28A0092B-C50C-407E-A947-70E740481C1C}">
+                <a14:useLocalDpi xmlns:a14="http://schemas.microsoft.com/office/drawing/2010/main" val="0"/>
+              </a:ext>
+            </a:extLst>
+          </a:blip>
+          <a:srcRect/>
+          <a:stretch>
+            <a:fillRect/>
+          </a:stretch>
+        </p:blipFill>
+        <p:spPr bwMode="auto">
+          <a:xfrm>
+            <a:off x="0" y="0"/>
+            <a:ext cx="9525" cy="9525"/>
+          </a:xfrm>
+          <a:prstGeom prst="rect">
+            <a:avLst/>
+          </a:prstGeom>
+          <a:noFill/>
+          <a:extLst>
+            <a:ext uri="{909E8E84-426E-40DD-AFC4-6F175D3DCCD1}">
+              <a14:hiddenFill xmlns:a14="http://schemas.microsoft.com/office/drawing/2010/main">
+                <a:solidFill>
+                  <a:srgbClr val="FFFFFF"/>
+                </a:solidFill>
+              </a14:hiddenFill>
+            </a:ext>
+          </a:extLst>
+        </p:spPr>
+      </p:pic>
+      <p:pic>
+        <p:nvPicPr>
+          <p:cNvPr id="2065" name="Picture 17" descr="Drop">
+            <a:extLst>
+              <a:ext uri="{FF2B5EF4-FFF2-40B4-BE49-F238E27FC236}">
+                <a16:creationId xmlns:a16="http://schemas.microsoft.com/office/drawing/2014/main" id="{4FC6DEBE-AAA9-14A3-7FEC-3E2612E8845D}"/>
+              </a:ext>
+            </a:extLst>
+          </p:cNvPr>
+          <p:cNvPicPr>
+            <a:picLocks noChangeAspect="1" noChangeArrowheads="1"/>
+          </p:cNvPicPr>
+          <p:nvPr/>
+        </p:nvPicPr>
+        <p:blipFill>
+          <a:blip r:embed="rId3">
+            <a:extLst>
+              <a:ext uri="{28A0092B-C50C-407E-A947-70E740481C1C}">
+                <a14:useLocalDpi xmlns:a14="http://schemas.microsoft.com/office/drawing/2010/main" val="0"/>
+              </a:ext>
+            </a:extLst>
+          </a:blip>
+          <a:srcRect/>
+          <a:stretch>
+            <a:fillRect/>
+          </a:stretch>
+        </p:blipFill>
+        <p:spPr bwMode="auto">
+          <a:xfrm>
+            <a:off x="0" y="0"/>
+            <a:ext cx="9525" cy="9525"/>
+          </a:xfrm>
+          <a:prstGeom prst="rect">
+            <a:avLst/>
+          </a:prstGeom>
+          <a:noFill/>
+          <a:extLst>
+            <a:ext uri="{909E8E84-426E-40DD-AFC4-6F175D3DCCD1}">
+              <a14:hiddenFill xmlns:a14="http://schemas.microsoft.com/office/drawing/2010/main">
+                <a:solidFill>
+                  <a:srgbClr val="FFFFFF"/>
+                </a:solidFill>
+              </a14:hiddenFill>
+            </a:ext>
+          </a:extLst>
+        </p:spPr>
+      </p:pic>
+      <p:pic>
+        <p:nvPicPr>
+          <p:cNvPr id="2066" name="HTMLCheckbox5">
+            <a:extLst>
+              <a:ext uri="{FF2B5EF4-FFF2-40B4-BE49-F238E27FC236}">
+                <a16:creationId xmlns:a16="http://schemas.microsoft.com/office/drawing/2014/main" id="{BD92C340-955D-294E-6C82-21E976E93D8A}"/>
+              </a:ext>
+            </a:extLst>
+          </p:cNvPr>
+          <p:cNvPicPr preferRelativeResize="0">
+            <a:picLocks noChangeArrowheads="1" noChangeShapeType="1"/>
+          </p:cNvPicPr>
+          <p:nvPr/>
+        </p:nvPicPr>
+        <p:blipFill>
+          <a:blip r:embed="rId2">
+            <a:extLst>
+              <a:ext uri="{28A0092B-C50C-407E-A947-70E740481C1C}">
+                <a14:useLocalDpi xmlns:a14="http://schemas.microsoft.com/office/drawing/2010/main" val="0"/>
+              </a:ext>
+            </a:extLst>
+          </a:blip>
+          <a:srcRect/>
+          <a:stretch>
+            <a:fillRect/>
+          </a:stretch>
+        </p:blipFill>
+        <p:spPr bwMode="auto">
+          <a:xfrm>
+            <a:off x="0" y="0"/>
+            <a:ext cx="1371600" cy="274638"/>
+          </a:xfrm>
+          <a:prstGeom prst="rect">
+            <a:avLst/>
+          </a:prstGeom>
+          <a:noFill/>
+          <a:ln w="9525">
+            <a:miter lim="800000"/>
+            <a:headEnd/>
+            <a:tailEnd/>
+          </a:ln>
+          <a:effectLst/>
+          <a:extLst>
+            <a:ext uri="{AF507438-7753-43E0-B8FC-AC1667EBCBE1}">
+              <a14:hiddenEffects xmlns:a14="http://schemas.microsoft.com/office/drawing/2010/main">
+                <a:effectLst>
+                  <a:outerShdw dist="35921" dir="2700000" algn="ctr" rotWithShape="0">
+                    <a:schemeClr val="bg2"/>
+                  </a:outerShdw>
+                </a:effectLst>
+              </a14:hiddenEffects>
+            </a:ext>
+          </a:extLst>
+        </p:spPr>
+      </p:pic>
+      <p:pic>
+        <p:nvPicPr>
+          <p:cNvPr id="2067" name="Picture 19" descr="Change">
+            <a:extLst>
+              <a:ext uri="{FF2B5EF4-FFF2-40B4-BE49-F238E27FC236}">
+                <a16:creationId xmlns:a16="http://schemas.microsoft.com/office/drawing/2014/main" id="{EEAE8C53-9851-F6EF-48DB-A24BE3422F2F}"/>
+              </a:ext>
+            </a:extLst>
+          </p:cNvPr>
+          <p:cNvPicPr>
+            <a:picLocks noChangeAspect="1" noChangeArrowheads="1"/>
+          </p:cNvPicPr>
+          <p:nvPr/>
+        </p:nvPicPr>
+        <p:blipFill>
+          <a:blip r:embed="rId3">
+            <a:extLst>
+              <a:ext uri="{28A0092B-C50C-407E-A947-70E740481C1C}">
+                <a14:useLocalDpi xmlns:a14="http://schemas.microsoft.com/office/drawing/2010/main" val="0"/>
+              </a:ext>
+            </a:extLst>
+          </a:blip>
+          <a:srcRect/>
+          <a:stretch>
+            <a:fillRect/>
+          </a:stretch>
+        </p:blipFill>
+        <p:spPr bwMode="auto">
+          <a:xfrm>
+            <a:off x="0" y="0"/>
+            <a:ext cx="9525" cy="9525"/>
+          </a:xfrm>
+          <a:prstGeom prst="rect">
+            <a:avLst/>
+          </a:prstGeom>
+          <a:noFill/>
+          <a:extLst>
+            <a:ext uri="{909E8E84-426E-40DD-AFC4-6F175D3DCCD1}">
+              <a14:hiddenFill xmlns:a14="http://schemas.microsoft.com/office/drawing/2010/main">
+                <a:solidFill>
+                  <a:srgbClr val="FFFFFF"/>
+                </a:solidFill>
+              </a14:hiddenFill>
+            </a:ext>
+          </a:extLst>
+        </p:spPr>
+      </p:pic>
+      <p:pic>
+        <p:nvPicPr>
+          <p:cNvPr id="2068" name="Picture 20" descr="Drop">
+            <a:extLst>
+              <a:ext uri="{FF2B5EF4-FFF2-40B4-BE49-F238E27FC236}">
+                <a16:creationId xmlns:a16="http://schemas.microsoft.com/office/drawing/2014/main" id="{45584BB1-29F3-6183-3202-1C4219E674B4}"/>
+              </a:ext>
+            </a:extLst>
+          </p:cNvPr>
+          <p:cNvPicPr>
+            <a:picLocks noChangeAspect="1" noChangeArrowheads="1"/>
+          </p:cNvPicPr>
+          <p:nvPr/>
+        </p:nvPicPr>
+        <p:blipFill>
+          <a:blip r:embed="rId3">
+            <a:extLst>
+              <a:ext uri="{28A0092B-C50C-407E-A947-70E740481C1C}">
+                <a14:useLocalDpi xmlns:a14="http://schemas.microsoft.com/office/drawing/2010/main" val="0"/>
+              </a:ext>
+            </a:extLst>
+          </a:blip>
+          <a:srcRect/>
+          <a:stretch>
+            <a:fillRect/>
+          </a:stretch>
+        </p:blipFill>
+        <p:spPr bwMode="auto">
+          <a:xfrm>
+            <a:off x="0" y="0"/>
+            <a:ext cx="9525" cy="9525"/>
+          </a:xfrm>
+          <a:prstGeom prst="rect">
+            <a:avLst/>
+          </a:prstGeom>
+          <a:noFill/>
+          <a:extLst>
+            <a:ext uri="{909E8E84-426E-40DD-AFC4-6F175D3DCCD1}">
+              <a14:hiddenFill xmlns:a14="http://schemas.microsoft.com/office/drawing/2010/main">
+                <a:solidFill>
+                  <a:srgbClr val="FFFFFF"/>
+                </a:solidFill>
+              </a14:hiddenFill>
+            </a:ext>
+          </a:extLst>
+        </p:spPr>
+      </p:pic>
+      <p:pic>
+        <p:nvPicPr>
+          <p:cNvPr id="2069" name="HTMLCheckbox6">
+            <a:extLst>
+              <a:ext uri="{FF2B5EF4-FFF2-40B4-BE49-F238E27FC236}">
+                <a16:creationId xmlns:a16="http://schemas.microsoft.com/office/drawing/2014/main" id="{60BD47F5-912A-A84A-8041-04DEEF9B5125}"/>
+              </a:ext>
+            </a:extLst>
+          </p:cNvPr>
+          <p:cNvPicPr preferRelativeResize="0">
+            <a:picLocks noChangeArrowheads="1" noChangeShapeType="1"/>
+          </p:cNvPicPr>
+          <p:nvPr/>
+        </p:nvPicPr>
+        <p:blipFill>
+          <a:blip r:embed="rId2">
+            <a:extLst>
+              <a:ext uri="{28A0092B-C50C-407E-A947-70E740481C1C}">
+                <a14:useLocalDpi xmlns:a14="http://schemas.microsoft.com/office/drawing/2010/main" val="0"/>
+              </a:ext>
+            </a:extLst>
+          </a:blip>
+          <a:srcRect/>
+          <a:stretch>
+            <a:fillRect/>
+          </a:stretch>
+        </p:blipFill>
+        <p:spPr bwMode="auto">
+          <a:xfrm>
+            <a:off x="0" y="0"/>
+            <a:ext cx="1371600" cy="274638"/>
+          </a:xfrm>
+          <a:prstGeom prst="rect">
+            <a:avLst/>
+          </a:prstGeom>
+          <a:noFill/>
+          <a:ln w="9525">
+            <a:miter lim="800000"/>
+            <a:headEnd/>
+            <a:tailEnd/>
+          </a:ln>
+          <a:effectLst/>
+          <a:extLst>
+            <a:ext uri="{AF507438-7753-43E0-B8FC-AC1667EBCBE1}">
+              <a14:hiddenEffects xmlns:a14="http://schemas.microsoft.com/office/drawing/2010/main">
+                <a:effectLst>
+                  <a:outerShdw dist="35921" dir="2700000" algn="ctr" rotWithShape="0">
+                    <a:schemeClr val="bg2"/>
+                  </a:outerShdw>
+                </a:effectLst>
+              </a14:hiddenEffects>
+            </a:ext>
+          </a:extLst>
+        </p:spPr>
+      </p:pic>
     </p:spTree>
     <p:extLst>
       <p:ext uri="{BB962C8B-B14F-4D97-AF65-F5344CB8AC3E}">

</xml_diff>